<commit_message>
Commit for the following changes:
</commit_message>
<xml_diff>
--- a/CFWT 23 brand_deck (1) updated.pptx
+++ b/CFWT 23 brand_deck (1) updated.pptx
@@ -5,10 +5,10 @@
     <p:sldMasterId id="2147483648" r:id="rId1"/>
   </p:sldMasterIdLst>
   <p:notesMasterIdLst>
-    <p:notesMasterId r:id="rId13"/>
+    <p:notesMasterId r:id="rId14"/>
   </p:notesMasterIdLst>
   <p:handoutMasterIdLst>
-    <p:handoutMasterId r:id="rId14"/>
+    <p:handoutMasterId r:id="rId15"/>
   </p:handoutMasterIdLst>
   <p:sldIdLst>
     <p:sldId id="256" r:id="rId2"/>
@@ -20,8 +20,9 @@
     <p:sldId id="267" r:id="rId8"/>
     <p:sldId id="265" r:id="rId9"/>
     <p:sldId id="264" r:id="rId10"/>
-    <p:sldId id="259" r:id="rId11"/>
-    <p:sldId id="260" r:id="rId12"/>
+    <p:sldId id="271" r:id="rId11"/>
+    <p:sldId id="259" r:id="rId12"/>
+    <p:sldId id="269" r:id="rId13"/>
   </p:sldIdLst>
   <p:sldSz cx="12192000" cy="6858000"/>
   <p:notesSz cx="6858000" cy="9144000"/>
@@ -230,7 +231,7 @@
           <a:p>
             <a:fld id="{316DDEA4-190E-4095-9456-293A439BF9D4}" type="datetimeFigureOut">
               <a:rPr lang="en-US" smtClean="0"/>
-              <a:t>2/16/24</a:t>
+              <a:t>3/22/25</a:t>
             </a:fld>
             <a:endParaRPr lang="en-US"/>
           </a:p>
@@ -408,7 +409,7 @@
           <a:p>
             <a:fld id="{97D3A0AD-F7F8-4E22-8D44-7E72D8F4DC21}" type="datetimeFigureOut">
               <a:rPr lang="en-US" smtClean="0"/>
-              <a:t>2/16/24</a:t>
+              <a:t>3/22/25</a:t>
             </a:fld>
             <a:endParaRPr lang="en-US"/>
           </a:p>
@@ -676,6 +677,130 @@
 </p:notesMaster>
 </file>
 
+<file path=ppt/notesSlides/notesSlide1.xml><?xml version="1.0" encoding="utf-8"?>
+<p:notes xmlns:a="http://schemas.openxmlformats.org/drawingml/2006/main" xmlns:r="http://schemas.openxmlformats.org/officeDocument/2006/relationships" xmlns:p="http://schemas.openxmlformats.org/presentationml/2006/main">
+  <p:cSld>
+    <p:spTree>
+      <p:nvGrpSpPr>
+        <p:cNvPr id="1" name=""/>
+        <p:cNvGrpSpPr/>
+        <p:nvPr/>
+      </p:nvGrpSpPr>
+      <p:grpSpPr>
+        <a:xfrm>
+          <a:off x="0" y="0"/>
+          <a:ext cx="0" cy="0"/>
+          <a:chOff x="0" y="0"/>
+          <a:chExt cx="0" cy="0"/>
+        </a:xfrm>
+      </p:grpSpPr>
+      <p:sp>
+        <p:nvSpPr>
+          <p:cNvPr id="2" name="Slide Image Placeholder 1"/>
+          <p:cNvSpPr>
+            <a:spLocks noGrp="1" noRot="1" noChangeAspect="1"/>
+          </p:cNvSpPr>
+          <p:nvPr>
+            <p:ph type="sldImg"/>
+          </p:nvPr>
+        </p:nvSpPr>
+        <p:spPr/>
+      </p:sp>
+      <p:sp>
+        <p:nvSpPr>
+          <p:cNvPr id="3" name="Notes Placeholder 2"/>
+          <p:cNvSpPr>
+            <a:spLocks noGrp="1"/>
+          </p:cNvSpPr>
+          <p:nvPr>
+            <p:ph type="body" idx="1"/>
+          </p:nvPr>
+        </p:nvSpPr>
+        <p:spPr/>
+        <p:txBody>
+          <a:bodyPr/>
+          <a:lstStyle/>
+          <a:p>
+            <a:r>
+              <a:rPr lang="en-US" dirty="0"/>
+              <a:t>Please leverage these notes and the script (in bold) below when delivering the CPE Survey at the conclusion of the event. Attendees of the Adobe ColdFusion Summit must fill out the form in order to receive CPE credit for attending the event:</a:t>
+            </a:r>
+          </a:p>
+          <a:p>
+            <a:endParaRPr lang="en-US" dirty="0"/>
+          </a:p>
+          <a:p>
+            <a:r>
+              <a:rPr lang="en-US" b="1" dirty="0"/>
+              <a:t>Carahsoft and Adobe are pleased to offer 6.7 continuing professional education or CPE credits to those that attended todays event. To qualify, you must submit the form linked to the QR code </a:t>
+            </a:r>
+            <a:r>
+              <a:rPr lang="en-US" b="1"/>
+              <a:t>by Thursday, </a:t>
+            </a:r>
+            <a:r>
+              <a:rPr lang="en-US" b="1" dirty="0"/>
+              <a:t>April 20</a:t>
+            </a:r>
+            <a:r>
+              <a:rPr lang="en-US" b="1" baseline="30000" dirty="0"/>
+              <a:t>th</a:t>
+            </a:r>
+            <a:r>
+              <a:rPr lang="en-US" b="1" dirty="0"/>
+              <a:t>. If you do not submit this form, you will not receive a certificate of completion signifying the number of Continuing Professional Education of CPE credits you have earned.</a:t>
+            </a:r>
+          </a:p>
+          <a:p>
+            <a:endParaRPr lang="en-US" b="1" dirty="0"/>
+          </a:p>
+          <a:p>
+            <a:r>
+              <a:rPr lang="en-US" b="1" dirty="0"/>
+              <a:t>Please take a moment to answer the survey questions now. For those of you who meet CPE requirements, you will receive your certificate of completion within two weeks.</a:t>
+            </a:r>
+          </a:p>
+          <a:p>
+            <a:endParaRPr lang="en-US" dirty="0"/>
+          </a:p>
+        </p:txBody>
+      </p:sp>
+      <p:sp>
+        <p:nvSpPr>
+          <p:cNvPr id="4" name="Slide Number Placeholder 3"/>
+          <p:cNvSpPr>
+            <a:spLocks noGrp="1"/>
+          </p:cNvSpPr>
+          <p:nvPr>
+            <p:ph type="sldNum" sz="quarter" idx="5"/>
+          </p:nvPr>
+        </p:nvSpPr>
+        <p:spPr/>
+        <p:txBody>
+          <a:bodyPr/>
+          <a:lstStyle/>
+          <a:p>
+            <a:fld id="{5EA3C180-E3CA-45C3-BE55-43A71FA88E88}" type="slidenum">
+              <a:rPr lang="en-US" smtClean="0"/>
+              <a:t>12</a:t>
+            </a:fld>
+            <a:endParaRPr lang="en-US"/>
+          </a:p>
+        </p:txBody>
+      </p:sp>
+    </p:spTree>
+    <p:extLst>
+      <p:ext uri="{BB962C8B-B14F-4D97-AF65-F5344CB8AC3E}">
+        <p14:creationId xmlns:p14="http://schemas.microsoft.com/office/powerpoint/2010/main" val="2914337196"/>
+      </p:ext>
+    </p:extLst>
+  </p:cSld>
+  <p:clrMapOvr>
+    <a:masterClrMapping/>
+  </p:clrMapOvr>
+</p:notes>
+</file>
+
 <file path=ppt/slideLayouts/slideLayout1.xml><?xml version="1.0" encoding="utf-8"?>
 <p:sldLayout xmlns:a="http://schemas.openxmlformats.org/drawingml/2006/main" xmlns:r="http://schemas.openxmlformats.org/officeDocument/2006/relationships" xmlns:p="http://schemas.openxmlformats.org/presentationml/2006/main" type="title" preserve="1">
   <p:cSld name="Title Slide">
@@ -823,7 +948,7 @@
           <a:p>
             <a:fld id="{B4BC4C42-D1D2-48A6-888E-BB154087F9F6}" type="datetime1">
               <a:rPr lang="en-US" smtClean="0"/>
-              <a:t>2/16/24</a:t>
+              <a:t>3/22/25</a:t>
             </a:fld>
             <a:endParaRPr lang="en-US"/>
           </a:p>
@@ -1024,7 +1149,7 @@
           <a:p>
             <a:fld id="{18316AE6-2325-49DB-B148-26330E2FD277}" type="datetime1">
               <a:rPr lang="en-US" smtClean="0"/>
-              <a:t>2/16/24</a:t>
+              <a:t>3/22/25</a:t>
             </a:fld>
             <a:endParaRPr lang="en-US"/>
           </a:p>
@@ -1235,7 +1360,7 @@
           <a:p>
             <a:fld id="{6ECF08CB-49A1-43D4-9E9B-0DBBFBE54C08}" type="datetime1">
               <a:rPr lang="en-US" smtClean="0"/>
-              <a:t>2/16/24</a:t>
+              <a:t>3/22/25</a:t>
             </a:fld>
             <a:endParaRPr lang="en-US"/>
           </a:p>
@@ -1436,7 +1561,7 @@
           <a:p>
             <a:fld id="{105BBFFB-78F7-45D0-B0F7-C9ABBFCC4691}" type="datetime1">
               <a:rPr lang="en-US" smtClean="0"/>
-              <a:t>2/16/24</a:t>
+              <a:t>3/22/25</a:t>
             </a:fld>
             <a:endParaRPr lang="en-US"/>
           </a:p>
@@ -1714,7 +1839,7 @@
           <a:p>
             <a:fld id="{7277E951-9294-4411-ABD9-4F5B08EBC92B}" type="datetime1">
               <a:rPr lang="en-US" smtClean="0"/>
-              <a:t>2/16/24</a:t>
+              <a:t>3/22/25</a:t>
             </a:fld>
             <a:endParaRPr lang="en-US"/>
           </a:p>
@@ -1982,7 +2107,7 @@
           <a:p>
             <a:fld id="{E28634BB-C7C5-4027-9EC9-E3EB86FCAEF3}" type="datetime1">
               <a:rPr lang="en-US" smtClean="0"/>
-              <a:t>2/16/24</a:t>
+              <a:t>3/22/25</a:t>
             </a:fld>
             <a:endParaRPr lang="en-US"/>
           </a:p>
@@ -2397,7 +2522,7 @@
           <a:p>
             <a:fld id="{640DA9FB-1B58-4ED0-93BA-D955084D1D32}" type="datetime1">
               <a:rPr lang="en-US" smtClean="0"/>
-              <a:t>2/16/24</a:t>
+              <a:t>3/22/25</a:t>
             </a:fld>
             <a:endParaRPr lang="en-US"/>
           </a:p>
@@ -2541,7 +2666,7 @@
           <a:p>
             <a:fld id="{5271C941-E01D-4E80-8E0E-12B6D345AD24}" type="datetime1">
               <a:rPr lang="en-US" smtClean="0"/>
-              <a:t>2/16/24</a:t>
+              <a:t>3/22/25</a:t>
             </a:fld>
             <a:endParaRPr lang="en-US"/>
           </a:p>
@@ -2657,7 +2782,7 @@
           <a:p>
             <a:fld id="{4F0F3D3D-20C8-4D64-A483-2C4C8EBC1BD9}" type="datetime1">
               <a:rPr lang="en-US" smtClean="0"/>
-              <a:t>2/16/24</a:t>
+              <a:t>3/22/25</a:t>
             </a:fld>
             <a:endParaRPr lang="en-US"/>
           </a:p>
@@ -2971,7 +3096,7 @@
           <a:p>
             <a:fld id="{3F4FD0B4-F151-47BF-95A6-DA20B44AE473}" type="datetime1">
               <a:rPr lang="en-US" smtClean="0"/>
-              <a:t>2/16/24</a:t>
+              <a:t>3/22/25</a:t>
             </a:fld>
             <a:endParaRPr lang="en-US"/>
           </a:p>
@@ -3262,7 +3387,7 @@
           <a:p>
             <a:fld id="{4B55E73E-FC96-4445-9331-78F7215BD613}" type="datetime1">
               <a:rPr lang="en-US" smtClean="0"/>
-              <a:t>2/16/24</a:t>
+              <a:t>3/22/25</a:t>
             </a:fld>
             <a:endParaRPr lang="en-US"/>
           </a:p>
@@ -3506,7 +3631,7 @@
           <a:p>
             <a:fld id="{46644D5E-C3C0-4BE1-A478-33544A5F7BFF}" type="datetime1">
               <a:rPr lang="en-US" smtClean="0"/>
-              <a:t>2/16/24</a:t>
+              <a:t>3/22/25</a:t>
             </a:fld>
             <a:endParaRPr lang="en-US"/>
           </a:p>
@@ -4138,336 +4263,6 @@
 <file path=ppt/slides/slide10.xml><?xml version="1.0" encoding="utf-8"?>
 <p:sld xmlns:a="http://schemas.openxmlformats.org/drawingml/2006/main" xmlns:r="http://schemas.openxmlformats.org/officeDocument/2006/relationships" xmlns:p="http://schemas.openxmlformats.org/presentationml/2006/main">
   <p:cSld>
-    <p:spTree>
-      <p:nvGrpSpPr>
-        <p:cNvPr id="1" name=""/>
-        <p:cNvGrpSpPr/>
-        <p:nvPr/>
-      </p:nvGrpSpPr>
-      <p:grpSpPr>
-        <a:xfrm>
-          <a:off x="0" y="0"/>
-          <a:ext cx="0" cy="0"/>
-          <a:chOff x="0" y="0"/>
-          <a:chExt cx="0" cy="0"/>
-        </a:xfrm>
-      </p:grpSpPr>
-      <p:pic>
-        <p:nvPicPr>
-          <p:cNvPr id="5" name="Picture 4" descr="A white background with hexagons&#10;&#10;Description automatically generated">
-            <a:extLst>
-              <a:ext uri="{FF2B5EF4-FFF2-40B4-BE49-F238E27FC236}">
-                <a16:creationId xmlns:a16="http://schemas.microsoft.com/office/drawing/2014/main" id="{57167341-08E4-3FAE-09CA-8A71930D4A9E}"/>
-              </a:ext>
-            </a:extLst>
-          </p:cNvPr>
-          <p:cNvPicPr>
-            <a:picLocks noChangeAspect="1"/>
-          </p:cNvPicPr>
-          <p:nvPr/>
-        </p:nvPicPr>
-        <p:blipFill>
-          <a:blip r:embed="rId2">
-            <a:extLst>
-              <a:ext uri="{28A0092B-C50C-407E-A947-70E740481C1C}">
-                <a14:useLocalDpi xmlns:a14="http://schemas.microsoft.com/office/drawing/2010/main" val="0"/>
-              </a:ext>
-            </a:extLst>
-          </a:blip>
-          <a:stretch>
-            <a:fillRect/>
-          </a:stretch>
-        </p:blipFill>
-        <p:spPr>
-          <a:xfrm>
-            <a:off x="-1" y="1"/>
-            <a:ext cx="12192001" cy="6857612"/>
-          </a:xfrm>
-          <a:prstGeom prst="rect">
-            <a:avLst/>
-          </a:prstGeom>
-        </p:spPr>
-      </p:pic>
-      <p:pic>
-        <p:nvPicPr>
-          <p:cNvPr id="7" name="Picture 6" descr="A logo with a black background&#10;&#10;Description automatically generated">
-            <a:extLst>
-              <a:ext uri="{FF2B5EF4-FFF2-40B4-BE49-F238E27FC236}">
-                <a16:creationId xmlns:a16="http://schemas.microsoft.com/office/drawing/2014/main" id="{A2D35E13-70EC-569F-C463-6419605AD942}"/>
-              </a:ext>
-            </a:extLst>
-          </p:cNvPr>
-          <p:cNvPicPr>
-            <a:picLocks noChangeAspect="1"/>
-          </p:cNvPicPr>
-          <p:nvPr/>
-        </p:nvPicPr>
-        <p:blipFill>
-          <a:blip r:embed="rId3">
-            <a:extLst>
-              <a:ext uri="{28A0092B-C50C-407E-A947-70E740481C1C}">
-                <a14:useLocalDpi xmlns:a14="http://schemas.microsoft.com/office/drawing/2010/main" val="0"/>
-              </a:ext>
-            </a:extLst>
-          </a:blip>
-          <a:stretch>
-            <a:fillRect/>
-          </a:stretch>
-        </p:blipFill>
-        <p:spPr>
-          <a:xfrm>
-            <a:off x="0" y="-349968"/>
-            <a:ext cx="4102217" cy="2563886"/>
-          </a:xfrm>
-          <a:prstGeom prst="rect">
-            <a:avLst/>
-          </a:prstGeom>
-        </p:spPr>
-      </p:pic>
-      <p:sp>
-        <p:nvSpPr>
-          <p:cNvPr id="2" name="TextBox 1">
-            <a:extLst>
-              <a:ext uri="{FF2B5EF4-FFF2-40B4-BE49-F238E27FC236}">
-                <a16:creationId xmlns:a16="http://schemas.microsoft.com/office/drawing/2014/main" id="{AF1FBD9A-BC88-48B5-137F-AC54A2E234E0}"/>
-              </a:ext>
-            </a:extLst>
-          </p:cNvPr>
-          <p:cNvSpPr txBox="1"/>
-          <p:nvPr/>
-        </p:nvSpPr>
-        <p:spPr>
-          <a:xfrm>
-            <a:off x="1542473" y="2844800"/>
-            <a:ext cx="9596582" cy="769441"/>
-          </a:xfrm>
-          <a:prstGeom prst="rect">
-            <a:avLst/>
-          </a:prstGeom>
-          <a:noFill/>
-        </p:spPr>
-        <p:txBody>
-          <a:bodyPr wrap="square" rtlCol="0">
-            <a:spAutoFit/>
-          </a:bodyPr>
-          <a:lstStyle/>
-          <a:p>
-            <a:pPr algn="ctr"/>
-            <a:r>
-              <a:rPr lang="en-US" sz="4400" dirty="0">
-                <a:solidFill>
-                  <a:srgbClr val="002060"/>
-                </a:solidFill>
-                <a:latin typeface="Roboto Light" panose="02000000000000000000" pitchFamily="2" charset="0"/>
-                <a:ea typeface="Roboto Light" panose="02000000000000000000" pitchFamily="2" charset="0"/>
-              </a:rPr>
-              <a:t>Questions?</a:t>
-            </a:r>
-          </a:p>
-        </p:txBody>
-      </p:sp>
-      <p:sp>
-        <p:nvSpPr>
-          <p:cNvPr id="4" name="TextBox 3">
-            <a:extLst>
-              <a:ext uri="{FF2B5EF4-FFF2-40B4-BE49-F238E27FC236}">
-                <a16:creationId xmlns:a16="http://schemas.microsoft.com/office/drawing/2014/main" id="{F702E54B-7D40-F5E7-567B-A3A643F3450B}"/>
-              </a:ext>
-            </a:extLst>
-          </p:cNvPr>
-          <p:cNvSpPr txBox="1"/>
-          <p:nvPr/>
-        </p:nvSpPr>
-        <p:spPr>
-          <a:xfrm>
-            <a:off x="3196294" y="5231035"/>
-            <a:ext cx="9596582" cy="523220"/>
-          </a:xfrm>
-          <a:prstGeom prst="rect">
-            <a:avLst/>
-          </a:prstGeom>
-          <a:noFill/>
-        </p:spPr>
-        <p:txBody>
-          <a:bodyPr wrap="square" rtlCol="0">
-            <a:spAutoFit/>
-          </a:bodyPr>
-          <a:lstStyle/>
-          <a:p>
-            <a:pPr algn="ctr"/>
-            <a:r>
-              <a:rPr lang="en-US" sz="2800" dirty="0">
-                <a:solidFill>
-                  <a:srgbClr val="002060"/>
-                </a:solidFill>
-                <a:latin typeface="Roboto" panose="02000000000000000000" pitchFamily="2" charset="0"/>
-                <a:ea typeface="Roboto" panose="02000000000000000000" pitchFamily="2" charset="0"/>
-              </a:rPr>
-              <a:t>Presented by: Monte Chan</a:t>
-            </a:r>
-          </a:p>
-        </p:txBody>
-      </p:sp>
-    </p:spTree>
-    <p:extLst>
-      <p:ext uri="{BB962C8B-B14F-4D97-AF65-F5344CB8AC3E}">
-        <p14:creationId xmlns:p14="http://schemas.microsoft.com/office/powerpoint/2010/main" val="589305988"/>
-      </p:ext>
-    </p:extLst>
-  </p:cSld>
-  <p:clrMapOvr>
-    <a:masterClrMapping/>
-  </p:clrMapOvr>
-</p:sld>
-</file>
-
-<file path=ppt/slides/slide11.xml><?xml version="1.0" encoding="utf-8"?>
-<p:sld xmlns:a="http://schemas.openxmlformats.org/drawingml/2006/main" xmlns:r="http://schemas.openxmlformats.org/officeDocument/2006/relationships" xmlns:p="http://schemas.openxmlformats.org/presentationml/2006/main">
-  <p:cSld>
-    <p:spTree>
-      <p:nvGrpSpPr>
-        <p:cNvPr id="1" name=""/>
-        <p:cNvGrpSpPr/>
-        <p:nvPr/>
-      </p:nvGrpSpPr>
-      <p:grpSpPr>
-        <a:xfrm>
-          <a:off x="0" y="0"/>
-          <a:ext cx="0" cy="0"/>
-          <a:chOff x="0" y="0"/>
-          <a:chExt cx="0" cy="0"/>
-        </a:xfrm>
-      </p:grpSpPr>
-      <p:pic>
-        <p:nvPicPr>
-          <p:cNvPr id="5" name="Picture 4" descr="A white background with hexagons&#10;&#10;Description automatically generated">
-            <a:extLst>
-              <a:ext uri="{FF2B5EF4-FFF2-40B4-BE49-F238E27FC236}">
-                <a16:creationId xmlns:a16="http://schemas.microsoft.com/office/drawing/2014/main" id="{57167341-08E4-3FAE-09CA-8A71930D4A9E}"/>
-              </a:ext>
-            </a:extLst>
-          </p:cNvPr>
-          <p:cNvPicPr>
-            <a:picLocks noChangeAspect="1"/>
-          </p:cNvPicPr>
-          <p:nvPr/>
-        </p:nvPicPr>
-        <p:blipFill>
-          <a:blip r:embed="rId2">
-            <a:extLst>
-              <a:ext uri="{28A0092B-C50C-407E-A947-70E740481C1C}">
-                <a14:useLocalDpi xmlns:a14="http://schemas.microsoft.com/office/drawing/2010/main" val="0"/>
-              </a:ext>
-            </a:extLst>
-          </a:blip>
-          <a:stretch>
-            <a:fillRect/>
-          </a:stretch>
-        </p:blipFill>
-        <p:spPr>
-          <a:xfrm>
-            <a:off x="0" y="0"/>
-            <a:ext cx="12192001" cy="6857999"/>
-          </a:xfrm>
-          <a:prstGeom prst="rect">
-            <a:avLst/>
-          </a:prstGeom>
-        </p:spPr>
-      </p:pic>
-      <p:pic>
-        <p:nvPicPr>
-          <p:cNvPr id="7" name="Picture 6" descr="A logo with a black background&#10;&#10;Description automatically generated">
-            <a:extLst>
-              <a:ext uri="{FF2B5EF4-FFF2-40B4-BE49-F238E27FC236}">
-                <a16:creationId xmlns:a16="http://schemas.microsoft.com/office/drawing/2014/main" id="{A2D35E13-70EC-569F-C463-6419605AD942}"/>
-              </a:ext>
-            </a:extLst>
-          </p:cNvPr>
-          <p:cNvPicPr>
-            <a:picLocks noChangeAspect="1"/>
-          </p:cNvPicPr>
-          <p:nvPr/>
-        </p:nvPicPr>
-        <p:blipFill>
-          <a:blip r:embed="rId3">
-            <a:extLst>
-              <a:ext uri="{28A0092B-C50C-407E-A947-70E740481C1C}">
-                <a14:useLocalDpi xmlns:a14="http://schemas.microsoft.com/office/drawing/2010/main" val="0"/>
-              </a:ext>
-            </a:extLst>
-          </a:blip>
-          <a:stretch>
-            <a:fillRect/>
-          </a:stretch>
-        </p:blipFill>
-        <p:spPr>
-          <a:xfrm>
-            <a:off x="0" y="-341579"/>
-            <a:ext cx="4102217" cy="2563886"/>
-          </a:xfrm>
-          <a:prstGeom prst="rect">
-            <a:avLst/>
-          </a:prstGeom>
-        </p:spPr>
-      </p:pic>
-      <p:sp>
-        <p:nvSpPr>
-          <p:cNvPr id="2" name="TextBox 1">
-            <a:extLst>
-              <a:ext uri="{FF2B5EF4-FFF2-40B4-BE49-F238E27FC236}">
-                <a16:creationId xmlns:a16="http://schemas.microsoft.com/office/drawing/2014/main" id="{AF1FBD9A-BC88-48B5-137F-AC54A2E234E0}"/>
-              </a:ext>
-            </a:extLst>
-          </p:cNvPr>
-          <p:cNvSpPr txBox="1"/>
-          <p:nvPr/>
-        </p:nvSpPr>
-        <p:spPr>
-          <a:xfrm>
-            <a:off x="1542473" y="2844800"/>
-            <a:ext cx="9596582" cy="769441"/>
-          </a:xfrm>
-          <a:prstGeom prst="rect">
-            <a:avLst/>
-          </a:prstGeom>
-          <a:noFill/>
-        </p:spPr>
-        <p:txBody>
-          <a:bodyPr wrap="square" rtlCol="0">
-            <a:spAutoFit/>
-          </a:bodyPr>
-          <a:lstStyle/>
-          <a:p>
-            <a:pPr algn="ctr"/>
-            <a:r>
-              <a:rPr lang="en-US" sz="4400" dirty="0">
-                <a:solidFill>
-                  <a:srgbClr val="002060"/>
-                </a:solidFill>
-                <a:latin typeface="Roboto Light" panose="02000000000000000000" pitchFamily="2" charset="0"/>
-                <a:ea typeface="Roboto Light" panose="02000000000000000000" pitchFamily="2" charset="0"/>
-              </a:rPr>
-              <a:t>Thank You!</a:t>
-            </a:r>
-          </a:p>
-        </p:txBody>
-      </p:sp>
-    </p:spTree>
-    <p:extLst>
-      <p:ext uri="{BB962C8B-B14F-4D97-AF65-F5344CB8AC3E}">
-        <p14:creationId xmlns:p14="http://schemas.microsoft.com/office/powerpoint/2010/main" val="2258230207"/>
-      </p:ext>
-    </p:extLst>
-  </p:cSld>
-  <p:clrMapOvr>
-    <a:masterClrMapping/>
-  </p:clrMapOvr>
-</p:sld>
-</file>
-
-<file path=ppt/slides/slide2.xml><?xml version="1.0" encoding="utf-8"?>
-<p:sld xmlns:a="http://schemas.openxmlformats.org/drawingml/2006/main" xmlns:r="http://schemas.openxmlformats.org/officeDocument/2006/relationships" xmlns:p="http://schemas.openxmlformats.org/presentationml/2006/main">
-  <p:cSld>
     <p:bg>
       <p:bgPr>
         <a:solidFill>
@@ -4478,7 +4273,13 @@
     </p:bg>
     <p:spTree>
       <p:nvGrpSpPr>
-        <p:cNvPr id="1" name=""/>
+        <p:cNvPr id="1" name="">
+          <a:extLst>
+            <a:ext uri="{FF2B5EF4-FFF2-40B4-BE49-F238E27FC236}">
+              <a16:creationId xmlns:a16="http://schemas.microsoft.com/office/drawing/2014/main" id="{0775FA30-4090-E79B-79A0-89617A447DDF}"/>
+            </a:ext>
+          </a:extLst>
+        </p:cNvPr>
         <p:cNvGrpSpPr/>
         <p:nvPr/>
       </p:nvGrpSpPr>
@@ -4495,7 +4296,7 @@
           <p:cNvPr id="12" name="Picture 11">
             <a:extLst>
               <a:ext uri="{FF2B5EF4-FFF2-40B4-BE49-F238E27FC236}">
-                <a16:creationId xmlns:a16="http://schemas.microsoft.com/office/drawing/2014/main" id="{E5715E08-146D-0759-2720-E84D70786BC1}"/>
+                <a16:creationId xmlns:a16="http://schemas.microsoft.com/office/drawing/2014/main" id="{15E843CC-0C11-9652-8840-4872BEC5379B}"/>
               </a:ext>
             </a:extLst>
           </p:cNvPr>
@@ -4512,8 +4313,8 @@
         </p:blipFill>
         <p:spPr>
           <a:xfrm>
-            <a:off x="-11151" y="0"/>
-            <a:ext cx="12188952" cy="6858000"/>
+            <a:off x="1" y="612"/>
+            <a:ext cx="12188952" cy="6864271"/>
           </a:xfrm>
           <a:prstGeom prst="rect">
             <a:avLst/>
@@ -4525,7 +4326,7 @@
           <p:cNvPr id="10" name="Rectangle 9">
             <a:extLst>
               <a:ext uri="{FF2B5EF4-FFF2-40B4-BE49-F238E27FC236}">
-                <a16:creationId xmlns:a16="http://schemas.microsoft.com/office/drawing/2014/main" id="{42A4FC2C-047E-45A5-965D-8E1E3BF09BC6}"/>
+                <a16:creationId xmlns:a16="http://schemas.microsoft.com/office/drawing/2014/main" id="{F3791353-5296-931D-F54D-C2B5D5B8DB6B}"/>
               </a:ext>
               <a:ext uri="{C183D7F6-B498-43B3-948B-1728B52AA6E4}">
                 <adec:decorative xmlns:adec="http://schemas.microsoft.com/office/drawing/2017/decorative" val="1"/>
@@ -4680,7 +4481,7 @@
           <p:cNvPr id="11" name="Footer Placeholder 10">
             <a:extLst>
               <a:ext uri="{FF2B5EF4-FFF2-40B4-BE49-F238E27FC236}">
-                <a16:creationId xmlns:a16="http://schemas.microsoft.com/office/drawing/2014/main" id="{BB1C0603-8047-1EA8-656C-93CC9FF56BB4}"/>
+                <a16:creationId xmlns:a16="http://schemas.microsoft.com/office/drawing/2014/main" id="{CD8A3C53-4C53-B9B8-F449-153037D74B2B}"/>
               </a:ext>
             </a:extLst>
           </p:cNvPr>
@@ -4715,7 +4516,7 @@
           <p:cNvPr id="2" name="Freeform: Shape 1">
             <a:extLst>
               <a:ext uri="{FF2B5EF4-FFF2-40B4-BE49-F238E27FC236}">
-                <a16:creationId xmlns:a16="http://schemas.microsoft.com/office/drawing/2014/main" id="{6DAD8027-1835-30F1-2138-FEEFB4294F47}"/>
+                <a16:creationId xmlns:a16="http://schemas.microsoft.com/office/drawing/2014/main" id="{BF20D196-2AA4-E605-C5C0-7C3CA5F825B6}"/>
               </a:ext>
             </a:extLst>
           </p:cNvPr>
@@ -4833,7 +4634,7 @@
           <p:cNvPr id="3" name="Picture 2" descr="A logo with a black background&#10;&#10;Description automatically generated">
             <a:extLst>
               <a:ext uri="{FF2B5EF4-FFF2-40B4-BE49-F238E27FC236}">
-                <a16:creationId xmlns:a16="http://schemas.microsoft.com/office/drawing/2014/main" id="{82989756-ED00-35D0-B232-FF0105CF924D}"/>
+                <a16:creationId xmlns:a16="http://schemas.microsoft.com/office/drawing/2014/main" id="{9AA35208-6BD3-48A8-E161-D91AF901477C}"/>
               </a:ext>
             </a:extLst>
           </p:cNvPr>
@@ -4869,7 +4670,7 @@
           <p:cNvPr id="4" name="TextBox 3">
             <a:extLst>
               <a:ext uri="{FF2B5EF4-FFF2-40B4-BE49-F238E27FC236}">
-                <a16:creationId xmlns:a16="http://schemas.microsoft.com/office/drawing/2014/main" id="{9E3EEE10-82D5-87E4-5878-1CDBB4D30E23}"/>
+                <a16:creationId xmlns:a16="http://schemas.microsoft.com/office/drawing/2014/main" id="{2D0F0B8D-6851-D0FF-CC88-1EC103EDD759}"/>
               </a:ext>
             </a:extLst>
           </p:cNvPr>
@@ -4878,8 +4679,8 @@
         </p:nvSpPr>
         <p:spPr>
           <a:xfrm>
-            <a:off x="566057" y="572220"/>
-            <a:ext cx="3302558" cy="523220"/>
+            <a:off x="849086" y="572220"/>
+            <a:ext cx="10657114" cy="5786199"/>
           </a:xfrm>
           <a:prstGeom prst="rect">
             <a:avLst/>
@@ -4893,162 +4694,90 @@
           <a:lstStyle/>
           <a:p>
             <a:r>
-              <a:rPr lang="en-US" sz="2800" dirty="0"/>
-              <a:t>Who is Monte Chan?</a:t>
-            </a:r>
-          </a:p>
-        </p:txBody>
-      </p:sp>
-      <p:sp>
-        <p:nvSpPr>
-          <p:cNvPr id="5" name="TextBox 4">
-            <a:extLst>
-              <a:ext uri="{FF2B5EF4-FFF2-40B4-BE49-F238E27FC236}">
-                <a16:creationId xmlns:a16="http://schemas.microsoft.com/office/drawing/2014/main" id="{EF36D861-DF68-5C6D-8119-18A5814B2A68}"/>
-              </a:ext>
-            </a:extLst>
-          </p:cNvPr>
-          <p:cNvSpPr txBox="1"/>
-          <p:nvPr/>
-        </p:nvSpPr>
-        <p:spPr>
-          <a:xfrm>
-            <a:off x="675249" y="1567027"/>
-            <a:ext cx="11015003" cy="3785652"/>
-          </a:xfrm>
-          <a:prstGeom prst="rect">
-            <a:avLst/>
-          </a:prstGeom>
-          <a:noFill/>
-        </p:spPr>
-        <p:txBody>
-          <a:bodyPr wrap="square" rtlCol="0">
-            <a:spAutoFit/>
-          </a:bodyPr>
-          <a:lstStyle/>
-          <a:p>
-            <a:pPr marL="285750" indent="-285750">
-              <a:buFont typeface="Arial" panose="020B0604020202020204" pitchFamily="34" charset="0"/>
-              <a:buChar char="•"/>
+              <a:rPr lang="en-US" sz="3200" dirty="0"/>
+              <a:t>Useful Information</a:t>
+            </a:r>
+          </a:p>
+          <a:p>
+            <a:endParaRPr lang="en-US" dirty="0"/>
+          </a:p>
+          <a:p>
+            <a:r>
+              <a:rPr lang="en-US" sz="3200" dirty="0"/>
+              <a:t>Custom Instructions: </a:t>
+            </a:r>
+          </a:p>
+          <a:p>
+            <a:pPr marL="457200" indent="-457200">
+              <a:buFont typeface="Wingdings" pitchFamily="2" charset="2"/>
+              <a:buChar char="n"/>
             </a:pPr>
             <a:r>
-              <a:rPr lang="en-US" sz="2400" dirty="0"/>
-              <a:t>Senior ColdFusion Developer at CF Webtools</a:t>
-            </a:r>
-          </a:p>
-          <a:p>
-            <a:pPr marL="285750" indent="-285750">
-              <a:buFont typeface="Arial" panose="020B0604020202020204" pitchFamily="34" charset="0"/>
-              <a:buChar char="•"/>
+              <a:rPr lang="en-US" sz="3200" dirty="0"/>
+              <a:t>VS Code Setting: </a:t>
+            </a:r>
+            <a:r>
+              <a:rPr lang="en-US" sz="3200" dirty="0" err="1"/>
+              <a:t>github.copilot.chat.codeGeneration.instructions</a:t>
+            </a:r>
+            <a:endParaRPr lang="en-US" sz="3200" dirty="0"/>
+          </a:p>
+          <a:p>
+            <a:pPr marL="457200" indent="-457200">
+              <a:buFont typeface="Wingdings" pitchFamily="2" charset="2"/>
+              <a:buChar char="n"/>
             </a:pPr>
             <a:r>
-              <a:rPr lang="en-US" sz="2400" dirty="0"/>
-              <a:t>Has used ColdFusion since version 4.5 back in 1999</a:t>
-            </a:r>
-          </a:p>
-          <a:p>
-            <a:pPr marL="285750" indent="-285750">
-              <a:buFont typeface="Arial" panose="020B0604020202020204" pitchFamily="34" charset="0"/>
-              <a:buChar char="•"/>
-            </a:pPr>
-            <a:r>
-              <a:rPr lang="en-US" sz="2400" dirty="0"/>
-              <a:t>Has developed web applications which were used in different industries (ex. Health insurance, education, </a:t>
-            </a:r>
-            <a:r>
-              <a:rPr lang="en-US" sz="2400" dirty="0" err="1"/>
-              <a:t>finTech</a:t>
-            </a:r>
-            <a:r>
-              <a:rPr lang="en-US" sz="2400" dirty="0"/>
-              <a:t>, e-commerce…etc.) </a:t>
-            </a:r>
-          </a:p>
-          <a:p>
-            <a:pPr marL="285750" indent="-285750">
-              <a:buFont typeface="Arial" panose="020B0604020202020204" pitchFamily="34" charset="0"/>
-              <a:buChar char="•"/>
-            </a:pPr>
-            <a:r>
-              <a:rPr lang="en-US" sz="2400" dirty="0"/>
-              <a:t>Was one of the co-managers of Alamo ColdFusion User Group</a:t>
-            </a:r>
-          </a:p>
-          <a:p>
-            <a:pPr marL="285750" indent="-285750">
-              <a:buFont typeface="Arial" panose="020B0604020202020204" pitchFamily="34" charset="0"/>
-              <a:buChar char="•"/>
-            </a:pPr>
-            <a:r>
-              <a:rPr lang="en-US" sz="2400" dirty="0"/>
-              <a:t>Has a </a:t>
-            </a:r>
-            <a:r>
-              <a:rPr lang="en-US" sz="2400" dirty="0" err="1"/>
-              <a:t>youTube</a:t>
-            </a:r>
-            <a:r>
-              <a:rPr lang="en-US" sz="2400" dirty="0"/>
-              <a:t> channel, Geek Talk. </a:t>
-            </a:r>
-            <a:r>
-              <a:rPr lang="en-US" sz="2400" dirty="0">
+              <a:rPr lang="en-US" sz="3200" dirty="0"/>
+              <a:t>Find more details on </a:t>
+            </a:r>
+            <a:r>
+              <a:rPr lang="en-US" sz="3200" dirty="0">
                 <a:hlinkClick r:id="rId4"/>
               </a:rPr>
-              <a:t>https://www.youtube.com/@geektalk2004</a:t>
-            </a:r>
-            <a:endParaRPr lang="en-US" sz="2400" dirty="0"/>
-          </a:p>
-          <a:p>
-            <a:pPr marL="285750" indent="-285750">
-              <a:buFont typeface="Arial" panose="020B0604020202020204" pitchFamily="34" charset="0"/>
-              <a:buChar char="•"/>
-            </a:pPr>
-            <a:r>
-              <a:rPr lang="en-US" sz="2400" dirty="0"/>
-              <a:t>On different social media platforms but mostly on Facebook.  You can find me on Facebook at https://</a:t>
-            </a:r>
-            <a:r>
-              <a:rPr lang="en-US" sz="2400" dirty="0" err="1"/>
-              <a:t>www.facebook.com</a:t>
-            </a:r>
-            <a:r>
-              <a:rPr lang="en-US" sz="2400" dirty="0"/>
-              <a:t>/</a:t>
-            </a:r>
-            <a:r>
-              <a:rPr lang="en-US" sz="2400" dirty="0" err="1"/>
-              <a:t>monte.chan</a:t>
-            </a:r>
-            <a:r>
-              <a:rPr lang="en-US" sz="2400" dirty="0"/>
-              <a:t>/</a:t>
-            </a:r>
-          </a:p>
-          <a:p>
-            <a:pPr marL="285750" indent="-285750">
-              <a:buFont typeface="Arial" panose="020B0604020202020204" pitchFamily="34" charset="0"/>
-              <a:buChar char="•"/>
-            </a:pPr>
-            <a:r>
-              <a:rPr lang="en-US" sz="2400" dirty="0"/>
-              <a:t>You can email me at </a:t>
-            </a:r>
-            <a:r>
-              <a:rPr lang="en-US" sz="2400" dirty="0" err="1"/>
-              <a:t>monte@monteandjanicechan.com</a:t>
-            </a:r>
-            <a:r>
-              <a:rPr lang="en-US" sz="2400" dirty="0"/>
-              <a:t> but you may get a quicker response if you send me a message in Facebook Messenger.</a:t>
-            </a:r>
+              <a:t>https://code.visualstudio.com/docs/copilot/copilot-customization</a:t>
+            </a:r>
+            <a:endParaRPr lang="en-US" sz="3200" dirty="0"/>
+          </a:p>
+          <a:p>
+            <a:r>
+              <a:rPr lang="en-US" sz="3200" dirty="0"/>
+              <a:t>Disabling Copilot on Files:</a:t>
+            </a:r>
+          </a:p>
+          <a:p>
+            <a:r>
+              <a:rPr lang="en-US" sz="3200" dirty="0"/>
+              <a:t>-- VS Code Setting: </a:t>
+            </a:r>
+            <a:r>
+              <a:rPr lang="en-US" sz="3200" dirty="0" err="1">
+                <a:effectLst/>
+                <a:latin typeface="Helvetica" pitchFamily="2" charset="0"/>
+              </a:rPr>
+              <a:t>github.copilot.enable</a:t>
+            </a:r>
+            <a:endParaRPr lang="en-US" sz="3200" dirty="0">
+              <a:effectLst/>
+              <a:latin typeface="Helvetica" pitchFamily="2" charset="0"/>
+            </a:endParaRPr>
+          </a:p>
+          <a:p>
+            <a:endParaRPr lang="en-US" sz="3200" dirty="0"/>
+          </a:p>
+          <a:p>
+            <a:endParaRPr lang="en-US" sz="3200" dirty="0">
+              <a:solidFill>
+                <a:srgbClr val="FF0000"/>
+              </a:solidFill>
+            </a:endParaRPr>
           </a:p>
         </p:txBody>
       </p:sp>
     </p:spTree>
     <p:extLst>
       <p:ext uri="{BB962C8B-B14F-4D97-AF65-F5344CB8AC3E}">
-        <p14:creationId xmlns:p14="http://schemas.microsoft.com/office/powerpoint/2010/main" val="2885452000"/>
+        <p14:creationId xmlns:p14="http://schemas.microsoft.com/office/powerpoint/2010/main" val="1210149509"/>
       </p:ext>
     </p:extLst>
   </p:cSld>
@@ -5058,7 +4787,496 @@
 </p:sld>
 </file>
 
-<file path=ppt/slides/slide3.xml><?xml version="1.0" encoding="utf-8"?>
+<file path=ppt/slides/slide11.xml><?xml version="1.0" encoding="utf-8"?>
+<p:sld xmlns:a="http://schemas.openxmlformats.org/drawingml/2006/main" xmlns:r="http://schemas.openxmlformats.org/officeDocument/2006/relationships" xmlns:p="http://schemas.openxmlformats.org/presentationml/2006/main">
+  <p:cSld>
+    <p:spTree>
+      <p:nvGrpSpPr>
+        <p:cNvPr id="1" name=""/>
+        <p:cNvGrpSpPr/>
+        <p:nvPr/>
+      </p:nvGrpSpPr>
+      <p:grpSpPr>
+        <a:xfrm>
+          <a:off x="0" y="0"/>
+          <a:ext cx="0" cy="0"/>
+          <a:chOff x="0" y="0"/>
+          <a:chExt cx="0" cy="0"/>
+        </a:xfrm>
+      </p:grpSpPr>
+      <p:pic>
+        <p:nvPicPr>
+          <p:cNvPr id="5" name="Picture 4" descr="A white background with hexagons&#10;&#10;Description automatically generated">
+            <a:extLst>
+              <a:ext uri="{FF2B5EF4-FFF2-40B4-BE49-F238E27FC236}">
+                <a16:creationId xmlns:a16="http://schemas.microsoft.com/office/drawing/2014/main" id="{57167341-08E4-3FAE-09CA-8A71930D4A9E}"/>
+              </a:ext>
+            </a:extLst>
+          </p:cNvPr>
+          <p:cNvPicPr>
+            <a:picLocks noChangeAspect="1"/>
+          </p:cNvPicPr>
+          <p:nvPr/>
+        </p:nvPicPr>
+        <p:blipFill>
+          <a:blip r:embed="rId2">
+            <a:extLst>
+              <a:ext uri="{28A0092B-C50C-407E-A947-70E740481C1C}">
+                <a14:useLocalDpi xmlns:a14="http://schemas.microsoft.com/office/drawing/2010/main" val="0"/>
+              </a:ext>
+            </a:extLst>
+          </a:blip>
+          <a:stretch>
+            <a:fillRect/>
+          </a:stretch>
+        </p:blipFill>
+        <p:spPr>
+          <a:xfrm>
+            <a:off x="-1" y="1"/>
+            <a:ext cx="12192001" cy="6857612"/>
+          </a:xfrm>
+          <a:prstGeom prst="rect">
+            <a:avLst/>
+          </a:prstGeom>
+        </p:spPr>
+      </p:pic>
+      <p:pic>
+        <p:nvPicPr>
+          <p:cNvPr id="7" name="Picture 6" descr="A logo with a black background&#10;&#10;Description automatically generated">
+            <a:extLst>
+              <a:ext uri="{FF2B5EF4-FFF2-40B4-BE49-F238E27FC236}">
+                <a16:creationId xmlns:a16="http://schemas.microsoft.com/office/drawing/2014/main" id="{A2D35E13-70EC-569F-C463-6419605AD942}"/>
+              </a:ext>
+            </a:extLst>
+          </p:cNvPr>
+          <p:cNvPicPr>
+            <a:picLocks noChangeAspect="1"/>
+          </p:cNvPicPr>
+          <p:nvPr/>
+        </p:nvPicPr>
+        <p:blipFill>
+          <a:blip r:embed="rId3">
+            <a:extLst>
+              <a:ext uri="{28A0092B-C50C-407E-A947-70E740481C1C}">
+                <a14:useLocalDpi xmlns:a14="http://schemas.microsoft.com/office/drawing/2010/main" val="0"/>
+              </a:ext>
+            </a:extLst>
+          </a:blip>
+          <a:stretch>
+            <a:fillRect/>
+          </a:stretch>
+        </p:blipFill>
+        <p:spPr>
+          <a:xfrm>
+            <a:off x="0" y="-349968"/>
+            <a:ext cx="4102217" cy="2563886"/>
+          </a:xfrm>
+          <a:prstGeom prst="rect">
+            <a:avLst/>
+          </a:prstGeom>
+        </p:spPr>
+      </p:pic>
+      <p:sp>
+        <p:nvSpPr>
+          <p:cNvPr id="2" name="TextBox 1">
+            <a:extLst>
+              <a:ext uri="{FF2B5EF4-FFF2-40B4-BE49-F238E27FC236}">
+                <a16:creationId xmlns:a16="http://schemas.microsoft.com/office/drawing/2014/main" id="{AF1FBD9A-BC88-48B5-137F-AC54A2E234E0}"/>
+              </a:ext>
+            </a:extLst>
+          </p:cNvPr>
+          <p:cNvSpPr txBox="1"/>
+          <p:nvPr/>
+        </p:nvSpPr>
+        <p:spPr>
+          <a:xfrm>
+            <a:off x="1542473" y="2844800"/>
+            <a:ext cx="9596582" cy="769441"/>
+          </a:xfrm>
+          <a:prstGeom prst="rect">
+            <a:avLst/>
+          </a:prstGeom>
+          <a:noFill/>
+        </p:spPr>
+        <p:txBody>
+          <a:bodyPr wrap="square" rtlCol="0">
+            <a:spAutoFit/>
+          </a:bodyPr>
+          <a:lstStyle/>
+          <a:p>
+            <a:pPr algn="ctr"/>
+            <a:r>
+              <a:rPr lang="en-US" sz="4400" dirty="0">
+                <a:solidFill>
+                  <a:srgbClr val="002060"/>
+                </a:solidFill>
+                <a:latin typeface="Roboto Light" panose="02000000000000000000" pitchFamily="2" charset="0"/>
+                <a:ea typeface="Roboto Light" panose="02000000000000000000" pitchFamily="2" charset="0"/>
+              </a:rPr>
+              <a:t>Questions?</a:t>
+            </a:r>
+          </a:p>
+        </p:txBody>
+      </p:sp>
+      <p:sp>
+        <p:nvSpPr>
+          <p:cNvPr id="4" name="TextBox 3">
+            <a:extLst>
+              <a:ext uri="{FF2B5EF4-FFF2-40B4-BE49-F238E27FC236}">
+                <a16:creationId xmlns:a16="http://schemas.microsoft.com/office/drawing/2014/main" id="{F702E54B-7D40-F5E7-567B-A3A643F3450B}"/>
+              </a:ext>
+            </a:extLst>
+          </p:cNvPr>
+          <p:cNvSpPr txBox="1"/>
+          <p:nvPr/>
+        </p:nvSpPr>
+        <p:spPr>
+          <a:xfrm>
+            <a:off x="3196294" y="5231035"/>
+            <a:ext cx="9596582" cy="523220"/>
+          </a:xfrm>
+          <a:prstGeom prst="rect">
+            <a:avLst/>
+          </a:prstGeom>
+          <a:noFill/>
+        </p:spPr>
+        <p:txBody>
+          <a:bodyPr wrap="square" rtlCol="0">
+            <a:spAutoFit/>
+          </a:bodyPr>
+          <a:lstStyle/>
+          <a:p>
+            <a:pPr algn="ctr"/>
+            <a:r>
+              <a:rPr lang="en-US" sz="2800" dirty="0">
+                <a:solidFill>
+                  <a:srgbClr val="002060"/>
+                </a:solidFill>
+                <a:latin typeface="Roboto" panose="02000000000000000000" pitchFamily="2" charset="0"/>
+                <a:ea typeface="Roboto" panose="02000000000000000000" pitchFamily="2" charset="0"/>
+              </a:rPr>
+              <a:t>Presented by: Monte Chan</a:t>
+            </a:r>
+          </a:p>
+        </p:txBody>
+      </p:sp>
+    </p:spTree>
+    <p:extLst>
+      <p:ext uri="{BB962C8B-B14F-4D97-AF65-F5344CB8AC3E}">
+        <p14:creationId xmlns:p14="http://schemas.microsoft.com/office/powerpoint/2010/main" val="589305988"/>
+      </p:ext>
+    </p:extLst>
+  </p:cSld>
+  <p:clrMapOvr>
+    <a:masterClrMapping/>
+  </p:clrMapOvr>
+</p:sld>
+</file>
+
+<file path=ppt/slides/slide12.xml><?xml version="1.0" encoding="utf-8"?>
+<p:sld xmlns:a="http://schemas.openxmlformats.org/drawingml/2006/main" xmlns:r="http://schemas.openxmlformats.org/officeDocument/2006/relationships" xmlns:p="http://schemas.openxmlformats.org/presentationml/2006/main">
+  <p:cSld>
+    <p:bg>
+      <p:bgPr>
+        <a:solidFill>
+          <a:schemeClr val="bg2">
+            <a:lumMod val="90000"/>
+          </a:schemeClr>
+        </a:solidFill>
+        <a:effectLst/>
+      </p:bgPr>
+    </p:bg>
+    <p:spTree>
+      <p:nvGrpSpPr>
+        <p:cNvPr id="1" name=""/>
+        <p:cNvGrpSpPr/>
+        <p:nvPr/>
+      </p:nvGrpSpPr>
+      <p:grpSpPr>
+        <a:xfrm>
+          <a:off x="0" y="0"/>
+          <a:ext cx="0" cy="0"/>
+          <a:chOff x="0" y="0"/>
+          <a:chExt cx="0" cy="0"/>
+        </a:xfrm>
+      </p:grpSpPr>
+      <p:sp>
+        <p:nvSpPr>
+          <p:cNvPr id="6" name="TextBox 5">
+            <a:extLst>
+              <a:ext uri="{FF2B5EF4-FFF2-40B4-BE49-F238E27FC236}">
+                <a16:creationId xmlns:a16="http://schemas.microsoft.com/office/drawing/2014/main" id="{8BD5A19B-FA07-9F35-8A69-65FB7547C4CA}"/>
+              </a:ext>
+            </a:extLst>
+          </p:cNvPr>
+          <p:cNvSpPr txBox="1"/>
+          <p:nvPr/>
+        </p:nvSpPr>
+        <p:spPr>
+          <a:xfrm>
+            <a:off x="313035" y="710392"/>
+            <a:ext cx="11697729" cy="1077218"/>
+          </a:xfrm>
+          <a:prstGeom prst="rect">
+            <a:avLst/>
+          </a:prstGeom>
+          <a:noFill/>
+        </p:spPr>
+        <p:txBody>
+          <a:bodyPr wrap="square" rtlCol="0">
+            <a:spAutoFit/>
+          </a:bodyPr>
+          <a:lstStyle/>
+          <a:p>
+            <a:pPr algn="ctr"/>
+            <a:r>
+              <a:rPr lang="en-US" sz="3200" dirty="0">
+                <a:solidFill>
+                  <a:srgbClr val="1473E7"/>
+                </a:solidFill>
+              </a:rPr>
+              <a:t>In order to receive CPE credits, you must complete the feedback form in its entirety.</a:t>
+            </a:r>
+          </a:p>
+        </p:txBody>
+      </p:sp>
+      <p:sp>
+        <p:nvSpPr>
+          <p:cNvPr id="7" name="Title 4">
+            <a:extLst>
+              <a:ext uri="{FF2B5EF4-FFF2-40B4-BE49-F238E27FC236}">
+                <a16:creationId xmlns:a16="http://schemas.microsoft.com/office/drawing/2014/main" id="{786EAB01-EE42-83FA-89ED-3570D497FF8A}"/>
+              </a:ext>
+            </a:extLst>
+          </p:cNvPr>
+          <p:cNvSpPr txBox="1">
+            <a:spLocks/>
+          </p:cNvSpPr>
+          <p:nvPr/>
+        </p:nvSpPr>
+        <p:spPr>
+          <a:xfrm>
+            <a:off x="3230924" y="128551"/>
+            <a:ext cx="5861953" cy="839072"/>
+          </a:xfrm>
+          <a:prstGeom prst="rect">
+            <a:avLst/>
+          </a:prstGeom>
+        </p:spPr>
+        <p:txBody>
+          <a:bodyPr vert="horz" lIns="91440" tIns="45720" rIns="91440" bIns="45720" rtlCol="0" anchor="ctr">
+            <a:normAutofit/>
+          </a:bodyPr>
+          <a:lstStyle>
+            <a:lvl1pPr algn="l" defTabSz="914400" rtl="0" eaLnBrk="1" latinLnBrk="0" hangingPunct="1">
+              <a:lnSpc>
+                <a:spcPct val="90000"/>
+              </a:lnSpc>
+              <a:spcBef>
+                <a:spcPct val="0"/>
+              </a:spcBef>
+              <a:buNone/>
+              <a:defRPr sz="4400" kern="1200">
+                <a:solidFill>
+                  <a:schemeClr val="tx1"/>
+                </a:solidFill>
+                <a:latin typeface="+mj-lt"/>
+                <a:ea typeface="+mj-ea"/>
+                <a:cs typeface="+mj-cs"/>
+              </a:defRPr>
+            </a:lvl1pPr>
+          </a:lstStyle>
+          <a:p>
+            <a:pPr algn="ctr"/>
+            <a:r>
+              <a:rPr lang="en-US" sz="4000" b="1" dirty="0">
+                <a:solidFill>
+                  <a:srgbClr val="1473E7"/>
+                </a:solidFill>
+                <a:latin typeface="+mn-lt"/>
+              </a:rPr>
+              <a:t>Feedback Survey</a:t>
+            </a:r>
+          </a:p>
+        </p:txBody>
+      </p:sp>
+      <p:sp>
+        <p:nvSpPr>
+          <p:cNvPr id="8" name="Title 4">
+            <a:extLst>
+              <a:ext uri="{FF2B5EF4-FFF2-40B4-BE49-F238E27FC236}">
+                <a16:creationId xmlns:a16="http://schemas.microsoft.com/office/drawing/2014/main" id="{E9A8EA2A-67B6-6DA5-AF94-B3D539452F57}"/>
+              </a:ext>
+            </a:extLst>
+          </p:cNvPr>
+          <p:cNvSpPr txBox="1">
+            <a:spLocks/>
+          </p:cNvSpPr>
+          <p:nvPr/>
+        </p:nvSpPr>
+        <p:spPr>
+          <a:xfrm>
+            <a:off x="-155625" y="2081819"/>
+            <a:ext cx="6123505" cy="2694361"/>
+          </a:xfrm>
+          <a:prstGeom prst="rect">
+            <a:avLst/>
+          </a:prstGeom>
+        </p:spPr>
+        <p:txBody>
+          <a:bodyPr vert="horz" lIns="91440" tIns="45720" rIns="91440" bIns="45720" rtlCol="0" anchor="b">
+            <a:normAutofit/>
+          </a:bodyPr>
+          <a:lstStyle>
+            <a:lvl1pPr algn="ctr" defTabSz="914400" rtl="0" eaLnBrk="1" latinLnBrk="0" hangingPunct="1">
+              <a:lnSpc>
+                <a:spcPct val="90000"/>
+              </a:lnSpc>
+              <a:spcBef>
+                <a:spcPct val="0"/>
+              </a:spcBef>
+              <a:buNone/>
+              <a:defRPr sz="6000" kern="1200">
+                <a:solidFill>
+                  <a:schemeClr val="tx1"/>
+                </a:solidFill>
+                <a:latin typeface="+mj-lt"/>
+                <a:ea typeface="+mj-ea"/>
+                <a:cs typeface="+mj-cs"/>
+              </a:defRPr>
+            </a:lvl1pPr>
+          </a:lstStyle>
+          <a:p>
+            <a:pPr algn="r"/>
+            <a:r>
+              <a:rPr lang="en-US" sz="3200" b="1" dirty="0">
+                <a:solidFill>
+                  <a:srgbClr val="1473E7"/>
+                </a:solidFill>
+              </a:rPr>
+              <a:t>Scan the QR code or use this link:</a:t>
+            </a:r>
+            <a:br>
+              <a:rPr lang="en-US" sz="3200" b="1" dirty="0">
+                <a:solidFill>
+                  <a:srgbClr val="1473E7"/>
+                </a:solidFill>
+                <a:latin typeface="+mn-lt"/>
+              </a:rPr>
+            </a:br>
+            <a:r>
+              <a:rPr lang="en-US" sz="2800" b="1" dirty="0">
+                <a:solidFill>
+                  <a:srgbClr val="1473E7"/>
+                </a:solidFill>
+                <a:effectLst/>
+                <a:ea typeface="Calibri" panose="020F0502020204030204" pitchFamily="34" charset="0"/>
+              </a:rPr>
+              <a:t>carah.io/</a:t>
+            </a:r>
+            <a:r>
+              <a:rPr lang="en-US" sz="2800" b="1" dirty="0">
+                <a:solidFill>
+                  <a:srgbClr val="1473E7"/>
+                </a:solidFill>
+                <a:ea typeface="Calibri" panose="020F0502020204030204" pitchFamily="34" charset="0"/>
+              </a:rPr>
+              <a:t>CFSummit2025CPE</a:t>
+            </a:r>
+            <a:endParaRPr lang="en-US" sz="2800" b="1" dirty="0">
+              <a:solidFill>
+                <a:srgbClr val="1473E7"/>
+              </a:solidFill>
+              <a:effectLst/>
+              <a:ea typeface="Calibri" panose="020F0502020204030204" pitchFamily="34" charset="0"/>
+            </a:endParaRPr>
+          </a:p>
+          <a:p>
+            <a:pPr algn="r"/>
+            <a:br>
+              <a:rPr lang="en-US" sz="3200" dirty="0">
+                <a:solidFill>
+                  <a:srgbClr val="1473E7"/>
+                </a:solidFill>
+              </a:rPr>
+            </a:br>
+            <a:br>
+              <a:rPr lang="en-US" sz="3200" b="1" dirty="0">
+                <a:solidFill>
+                  <a:srgbClr val="1473E7"/>
+                </a:solidFill>
+              </a:rPr>
+            </a:br>
+            <a:r>
+              <a:rPr lang="en-US" sz="3200" dirty="0">
+                <a:solidFill>
+                  <a:srgbClr val="1473E7"/>
+                </a:solidFill>
+              </a:rPr>
+              <a:t>Codeword: </a:t>
+            </a:r>
+            <a:r>
+              <a:rPr lang="en-US" sz="3200" b="1" dirty="0">
+                <a:solidFill>
+                  <a:srgbClr val="1473E7"/>
+                </a:solidFill>
+                <a:latin typeface="+mn-lt"/>
+              </a:rPr>
+              <a:t>DC Coder</a:t>
+            </a:r>
+          </a:p>
+        </p:txBody>
+      </p:sp>
+      <p:pic>
+        <p:nvPicPr>
+          <p:cNvPr id="4" name="Picture 3" descr="A qr code with a white square in the middle&#10;&#10;AI-generated content may be incorrect.">
+            <a:extLst>
+              <a:ext uri="{FF2B5EF4-FFF2-40B4-BE49-F238E27FC236}">
+                <a16:creationId xmlns:a16="http://schemas.microsoft.com/office/drawing/2014/main" id="{8F1BFB1D-93C2-C13C-0D7F-AD2F1FC16986}"/>
+              </a:ext>
+            </a:extLst>
+          </p:cNvPr>
+          <p:cNvPicPr>
+            <a:picLocks noChangeAspect="1"/>
+          </p:cNvPicPr>
+          <p:nvPr/>
+        </p:nvPicPr>
+        <p:blipFill>
+          <a:blip r:embed="rId3">
+            <a:extLst>
+              <a:ext uri="{28A0092B-C50C-407E-A947-70E740481C1C}">
+                <a14:useLocalDpi xmlns:a14="http://schemas.microsoft.com/office/drawing/2010/main" val="0"/>
+              </a:ext>
+            </a:extLst>
+          </a:blip>
+          <a:stretch>
+            <a:fillRect/>
+          </a:stretch>
+        </p:blipFill>
+        <p:spPr>
+          <a:xfrm>
+            <a:off x="7239001" y="1787610"/>
+            <a:ext cx="4301972" cy="4301972"/>
+          </a:xfrm>
+          <a:prstGeom prst="rect">
+            <a:avLst/>
+          </a:prstGeom>
+        </p:spPr>
+      </p:pic>
+    </p:spTree>
+    <p:extLst>
+      <p:ext uri="{BB962C8B-B14F-4D97-AF65-F5344CB8AC3E}">
+        <p14:creationId xmlns:p14="http://schemas.microsoft.com/office/powerpoint/2010/main" val="3927950700"/>
+      </p:ext>
+    </p:extLst>
+  </p:cSld>
+  <p:clrMapOvr>
+    <a:masterClrMapping/>
+  </p:clrMapOvr>
+</p:sld>
+</file>
+
+<file path=ppt/slides/slide2.xml><?xml version="1.0" encoding="utf-8"?>
 <p:sld xmlns:a="http://schemas.openxmlformats.org/drawingml/2006/main" xmlns:r="http://schemas.openxmlformats.org/officeDocument/2006/relationships" xmlns:p="http://schemas.openxmlformats.org/presentationml/2006/main">
   <p:cSld>
     <p:bg>
@@ -5487,7 +5705,7 @@
           <a:p>
             <a:r>
               <a:rPr lang="en-US" sz="2800" dirty="0"/>
-              <a:t>Before we begin…</a:t>
+              <a:t>Who is Monte Chan?</a:t>
             </a:r>
           </a:p>
         </p:txBody>
@@ -5507,7 +5725,7 @@
         <p:spPr>
           <a:xfrm>
             <a:off x="675249" y="1567027"/>
-            <a:ext cx="11015003" cy="2308324"/>
+            <a:ext cx="11015003" cy="3785652"/>
           </a:xfrm>
           <a:prstGeom prst="rect">
             <a:avLst/>
@@ -5526,7 +5744,7 @@
             </a:pPr>
             <a:r>
               <a:rPr lang="en-US" sz="2400" dirty="0"/>
-              <a:t>I don’t work for Microsoft.  </a:t>
+              <a:t>Senior ColdFusion Developer at CF Webtools</a:t>
             </a:r>
           </a:p>
           <a:p>
@@ -5536,15 +5754,7 @@
             </a:pPr>
             <a:r>
               <a:rPr lang="en-US" sz="2400" dirty="0"/>
-              <a:t>We are NOT going to talk ALL of the features of </a:t>
-            </a:r>
-            <a:r>
-              <a:rPr lang="en-US" sz="2400" dirty="0" err="1"/>
-              <a:t>Github</a:t>
-            </a:r>
-            <a:r>
-              <a:rPr lang="en-US" sz="2400" dirty="0"/>
-              <a:t> Copilot.</a:t>
+              <a:t>Has used ColdFusion since version 4.5 back in 1999</a:t>
             </a:r>
           </a:p>
           <a:p>
@@ -5554,7 +5764,15 @@
             </a:pPr>
             <a:r>
               <a:rPr lang="en-US" sz="2400" dirty="0"/>
-              <a:t>Hopefully, this generates enough interests in you that you would explore the features on your own.</a:t>
+              <a:t>Has developed web applications which were used in different industries (ex. Health insurance, education, </a:t>
+            </a:r>
+            <a:r>
+              <a:rPr lang="en-US" sz="2400" dirty="0" err="1"/>
+              <a:t>finTech</a:t>
+            </a:r>
+            <a:r>
+              <a:rPr lang="en-US" sz="2400" dirty="0"/>
+              <a:t>, e-commerce…etc.) </a:t>
             </a:r>
           </a:p>
           <a:p>
@@ -5564,31 +5782,76 @@
             </a:pPr>
             <a:r>
               <a:rPr lang="en-US" sz="2400" dirty="0"/>
-              <a:t>Alternates to </a:t>
+              <a:t>Was one of the co-managers of Alamo ColdFusion User Group</a:t>
+            </a:r>
+          </a:p>
+          <a:p>
+            <a:pPr marL="285750" indent="-285750">
+              <a:buFont typeface="Arial" panose="020B0604020202020204" pitchFamily="34" charset="0"/>
+              <a:buChar char="•"/>
+            </a:pPr>
+            <a:r>
+              <a:rPr lang="en-US" sz="2400" dirty="0"/>
+              <a:t>Has a </a:t>
             </a:r>
             <a:r>
               <a:rPr lang="en-US" sz="2400" dirty="0" err="1"/>
-              <a:t>Github</a:t>
+              <a:t>youTube</a:t>
             </a:r>
             <a:r>
               <a:rPr lang="en-US" sz="2400" dirty="0"/>
-              <a:t> Copilot: </a:t>
+              <a:t> channel, Geek Talk. </a:t>
+            </a:r>
+            <a:r>
+              <a:rPr lang="en-US" sz="2400" dirty="0">
+                <a:hlinkClick r:id="rId4"/>
+              </a:rPr>
+              <a:t>https://www.youtube.com/@geektalk2004</a:t>
+            </a:r>
+            <a:endParaRPr lang="en-US" sz="2400" dirty="0"/>
+          </a:p>
+          <a:p>
+            <a:pPr marL="285750" indent="-285750">
+              <a:buFont typeface="Arial" panose="020B0604020202020204" pitchFamily="34" charset="0"/>
+              <a:buChar char="•"/>
+            </a:pPr>
+            <a:r>
+              <a:rPr lang="en-US" sz="2400" dirty="0"/>
+              <a:t>On different social media platforms but mostly on Facebook.  You can find me on Facebook at https://</a:t>
             </a:r>
             <a:r>
               <a:rPr lang="en-US" sz="2400" dirty="0" err="1"/>
-              <a:t>Codeium</a:t>
+              <a:t>www.facebook.com</a:t>
             </a:r>
             <a:r>
               <a:rPr lang="en-US" sz="2400" dirty="0"/>
-              <a:t> (not to be confused with Codium), Amazon Q/</a:t>
+              <a:t>/</a:t>
             </a:r>
             <a:r>
               <a:rPr lang="en-US" sz="2400" dirty="0" err="1"/>
-              <a:t>CodeWhisperer</a:t>
+              <a:t>monte.chan</a:t>
             </a:r>
             <a:r>
               <a:rPr lang="en-US" sz="2400" dirty="0"/>
-              <a:t>, Chat-GPT, …etc.</a:t>
+              <a:t>/</a:t>
+            </a:r>
+          </a:p>
+          <a:p>
+            <a:pPr marL="285750" indent="-285750">
+              <a:buFont typeface="Arial" panose="020B0604020202020204" pitchFamily="34" charset="0"/>
+              <a:buChar char="•"/>
+            </a:pPr>
+            <a:r>
+              <a:rPr lang="en-US" sz="2400" dirty="0"/>
+              <a:t>You can email me at </a:t>
+            </a:r>
+            <a:r>
+              <a:rPr lang="en-US" sz="2400" dirty="0" err="1"/>
+              <a:t>monte@monteandjanicechan.com</a:t>
+            </a:r>
+            <a:r>
+              <a:rPr lang="en-US" sz="2400" dirty="0"/>
+              <a:t> but you may get a quicker response if you send me a message in Facebook Messenger.</a:t>
             </a:r>
           </a:p>
         </p:txBody>
@@ -5596,7 +5859,7 @@
     </p:spTree>
     <p:extLst>
       <p:ext uri="{BB962C8B-B14F-4D97-AF65-F5344CB8AC3E}">
-        <p14:creationId xmlns:p14="http://schemas.microsoft.com/office/powerpoint/2010/main" val="3212058639"/>
+        <p14:creationId xmlns:p14="http://schemas.microsoft.com/office/powerpoint/2010/main" val="2885452000"/>
       </p:ext>
     </p:extLst>
   </p:cSld>
@@ -5606,7 +5869,7 @@
 </p:sld>
 </file>
 
-<file path=ppt/slides/slide4.xml><?xml version="1.0" encoding="utf-8"?>
+<file path=ppt/slides/slide3.xml><?xml version="1.0" encoding="utf-8"?>
 <p:sld xmlns:a="http://schemas.openxmlformats.org/drawingml/2006/main" xmlns:r="http://schemas.openxmlformats.org/officeDocument/2006/relationships" xmlns:p="http://schemas.openxmlformats.org/presentationml/2006/main">
   <p:cSld>
     <p:bg>
@@ -5653,8 +5916,8 @@
         </p:blipFill>
         <p:spPr>
           <a:xfrm>
-            <a:off x="0" y="0"/>
-            <a:ext cx="12188952" cy="6864271"/>
+            <a:off x="-11151" y="0"/>
+            <a:ext cx="12188952" cy="6858000"/>
           </a:xfrm>
           <a:prstGeom prst="rect">
             <a:avLst/>
@@ -6010,7 +6273,7 @@
           <p:cNvPr id="4" name="TextBox 3">
             <a:extLst>
               <a:ext uri="{FF2B5EF4-FFF2-40B4-BE49-F238E27FC236}">
-                <a16:creationId xmlns:a16="http://schemas.microsoft.com/office/drawing/2014/main" id="{44E56F65-6D91-94FA-C22F-4E99F4853A59}"/>
+                <a16:creationId xmlns:a16="http://schemas.microsoft.com/office/drawing/2014/main" id="{9E3EEE10-82D5-87E4-5878-1CDBB4D30E23}"/>
               </a:ext>
             </a:extLst>
           </p:cNvPr>
@@ -6019,8 +6282,8 @@
         </p:nvSpPr>
         <p:spPr>
           <a:xfrm>
-            <a:off x="506437" y="572220"/>
-            <a:ext cx="3575779" cy="461665"/>
+            <a:off x="566057" y="572220"/>
+            <a:ext cx="3302558" cy="523220"/>
           </a:xfrm>
           <a:prstGeom prst="rect">
             <a:avLst/>
@@ -6034,16 +6297,8 @@
           <a:lstStyle/>
           <a:p>
             <a:r>
-              <a:rPr lang="en-US" sz="2400" dirty="0"/>
-              <a:t>What is </a:t>
-            </a:r>
-            <a:r>
-              <a:rPr lang="en-US" sz="2400" dirty="0" err="1"/>
-              <a:t>Github</a:t>
-            </a:r>
-            <a:r>
-              <a:rPr lang="en-US" sz="2400" dirty="0"/>
-              <a:t> Copilot?</a:t>
+              <a:rPr lang="en-US" sz="2800" dirty="0"/>
+              <a:t>Before we begin…</a:t>
             </a:r>
           </a:p>
         </p:txBody>
@@ -6053,7 +6308,7 @@
           <p:cNvPr id="5" name="TextBox 4">
             <a:extLst>
               <a:ext uri="{FF2B5EF4-FFF2-40B4-BE49-F238E27FC236}">
-                <a16:creationId xmlns:a16="http://schemas.microsoft.com/office/drawing/2014/main" id="{DCB20D65-07BD-84FD-DA08-461974F5EDE8}"/>
+                <a16:creationId xmlns:a16="http://schemas.microsoft.com/office/drawing/2014/main" id="{EF36D861-DF68-5C6D-8119-18A5814B2A68}"/>
               </a:ext>
             </a:extLst>
           </p:cNvPr>
@@ -6062,8 +6317,8 @@
         </p:nvSpPr>
         <p:spPr>
           <a:xfrm>
-            <a:off x="506437" y="1282327"/>
-            <a:ext cx="9650438" cy="6278642"/>
+            <a:off x="675249" y="1567027"/>
+            <a:ext cx="11015003" cy="4154984"/>
           </a:xfrm>
           <a:prstGeom prst="rect">
             <a:avLst/>
@@ -6082,7 +6337,15 @@
             </a:pPr>
             <a:r>
               <a:rPr lang="en-US" sz="2400" dirty="0"/>
-              <a:t>An AI pair programmer.  </a:t>
+              <a:t>We are NOT going to talk ALL of the features of </a:t>
+            </a:r>
+            <a:r>
+              <a:rPr lang="en-US" sz="2400" dirty="0" err="1"/>
+              <a:t>Github</a:t>
+            </a:r>
+            <a:r>
+              <a:rPr lang="en-US" sz="2400" dirty="0"/>
+              <a:t> Copilot.</a:t>
             </a:r>
           </a:p>
           <a:p>
@@ -6091,74 +6354,9 @@
               <a:buChar char="•"/>
             </a:pPr>
             <a:r>
-              <a:rPr lang="en-US" sz="2400" dirty="0" err="1"/>
-              <a:t>Github</a:t>
-            </a:r>
-            <a:r>
               <a:rPr lang="en-US" sz="2400" dirty="0"/>
-              <a:t> Copilot X was announced around September of 2023.  X is a placeholder.  Essentially, it is a family of projects/products that utilize the </a:t>
-            </a:r>
-            <a:r>
-              <a:rPr lang="en-US" sz="2400" dirty="0" err="1"/>
-              <a:t>Github</a:t>
-            </a:r>
-            <a:r>
-              <a:rPr lang="en-US" sz="2400" dirty="0"/>
-              <a:t> Copilot technology to give a more complete programming experience. </a:t>
-            </a:r>
-          </a:p>
-          <a:p>
-            <a:pPr marL="742950" lvl="1" indent="-285750">
-              <a:buFont typeface="Arial" panose="020B0604020202020204" pitchFamily="34" charset="0"/>
-              <a:buChar char="•"/>
-            </a:pPr>
-            <a:r>
-              <a:rPr lang="en-US" sz="2400" dirty="0"/>
-              <a:t>Copilot Chat – Chat-GPT like.  Comes with Individual license now.  Needed to join waitlist before.</a:t>
-            </a:r>
-          </a:p>
-          <a:p>
-            <a:pPr marL="742950" lvl="1" indent="-285750">
-              <a:buFont typeface="Arial" panose="020B0604020202020204" pitchFamily="34" charset="0"/>
-              <a:buChar char="•"/>
-            </a:pPr>
-            <a:r>
-              <a:rPr lang="en-US" sz="2400" dirty="0"/>
-              <a:t>Copilot Voice – formerly known as Hey </a:t>
-            </a:r>
-            <a:r>
-              <a:rPr lang="en-US" sz="2400" dirty="0" err="1"/>
-              <a:t>Github</a:t>
-            </a:r>
-            <a:r>
-              <a:rPr lang="en-US" sz="2400" dirty="0"/>
-              <a:t>. Need to join waitlist.  Program using natural language.</a:t>
-            </a:r>
-          </a:p>
-          <a:p>
-            <a:pPr marL="742950" lvl="1" indent="-285750">
-              <a:buFont typeface="Arial" panose="020B0604020202020204" pitchFamily="34" charset="0"/>
-              <a:buChar char="•"/>
-            </a:pPr>
-            <a:r>
-              <a:rPr lang="en-US" sz="2400" dirty="0"/>
-              <a:t>Copilot CLI, Copilot for PR, Copilot for Docs, …etc.</a:t>
-            </a:r>
-          </a:p>
-          <a:p>
-            <a:pPr marL="742950" lvl="1" indent="-285750">
-              <a:buFont typeface="Arial" panose="020B0604020202020204" pitchFamily="34" charset="0"/>
-              <a:buChar char="•"/>
-            </a:pPr>
-            <a:r>
-              <a:rPr lang="en-US" sz="2400" dirty="0"/>
-              <a:t>View them at </a:t>
-            </a:r>
-            <a:r>
-              <a:rPr lang="en-US" sz="2400" dirty="0" err="1"/>
-              <a:t>githubnext.com</a:t>
-            </a:r>
-            <a:endParaRPr lang="en-US" sz="2400" dirty="0"/>
+              <a:t>Hopefully, this generates enough interests in you that you would explore the features on your own.</a:t>
+            </a:r>
           </a:p>
           <a:p>
             <a:pPr marL="285750" indent="-285750">
@@ -6167,7 +6365,7 @@
             </a:pPr>
             <a:r>
               <a:rPr lang="en-US" sz="2400" dirty="0"/>
-              <a:t>Need a </a:t>
+              <a:t>Alternates to </a:t>
             </a:r>
             <a:r>
               <a:rPr lang="en-US" sz="2400" dirty="0" err="1"/>
@@ -6175,7 +6373,31 @@
             </a:r>
             <a:r>
               <a:rPr lang="en-US" sz="2400" dirty="0"/>
-              <a:t> account</a:t>
+              <a:t> Copilot: </a:t>
+            </a:r>
+            <a:r>
+              <a:rPr lang="en-US" sz="2400" dirty="0" err="1"/>
+              <a:t>Codeium</a:t>
+            </a:r>
+            <a:r>
+              <a:rPr lang="en-US" sz="2400" dirty="0"/>
+              <a:t> (not to be confused with </a:t>
+            </a:r>
+            <a:r>
+              <a:rPr lang="en-US" sz="2400" dirty="0" err="1"/>
+              <a:t>VSCodium</a:t>
+            </a:r>
+            <a:r>
+              <a:rPr lang="en-US" sz="2400" dirty="0"/>
+              <a:t>), Amazon Q/</a:t>
+            </a:r>
+            <a:r>
+              <a:rPr lang="en-US" sz="2400" dirty="0" err="1"/>
+              <a:t>CodeWhisperer</a:t>
+            </a:r>
+            <a:r>
+              <a:rPr lang="en-US" sz="2400" dirty="0"/>
+              <a:t>, Chat-GPT, Cursor …etc.</a:t>
             </a:r>
           </a:p>
           <a:p>
@@ -6185,22 +6407,37 @@
             </a:pPr>
             <a:r>
               <a:rPr lang="en-US" sz="2400" dirty="0"/>
-              <a:t>Pricing: 30 day trial $10 per month for individuals; $19 for business license</a:t>
-            </a:r>
-          </a:p>
-          <a:p>
-            <a:pPr marL="742950" lvl="1" indent="-285750">
+              <a:t>The presentation slides will be uploaded to my </a:t>
+            </a:r>
+            <a:r>
+              <a:rPr lang="en-US" sz="2400" dirty="0" err="1"/>
+              <a:t>Github</a:t>
+            </a:r>
+            <a:r>
+              <a:rPr lang="en-US" sz="2400" dirty="0"/>
+              <a:t> account at </a:t>
+            </a:r>
+            <a:r>
+              <a:rPr lang="en-US" sz="2400" dirty="0">
+                <a:hlinkClick r:id="rId4"/>
+              </a:rPr>
+              <a:t>https://github.com/knittingguy</a:t>
+            </a:r>
+            <a:endParaRPr lang="en-US" sz="2400" dirty="0"/>
+          </a:p>
+          <a:p>
+            <a:pPr marL="285750" indent="-285750">
               <a:buFont typeface="Arial" panose="020B0604020202020204" pitchFamily="34" charset="0"/>
               <a:buChar char="•"/>
             </a:pPr>
             <a:r>
+              <a:rPr lang="en-US" sz="2400" dirty="0" err="1"/>
+              <a:t>Github</a:t>
+            </a:r>
+            <a:r>
               <a:rPr lang="en-US" sz="2400" dirty="0"/>
-              <a:t>Copilot Business comes with Copilot Chat</a:t>
-            </a:r>
-          </a:p>
-          <a:p>
-            <a:pPr lvl="1"/>
-            <a:endParaRPr lang="en-US" sz="2400" dirty="0"/>
+              <a:t> Copilot is designed for different technologies.  The things that I talk about here are NOT exclusively for ColdFusion.  Chances are, the same practices apply to your development in other languages as well.</a:t>
+            </a:r>
           </a:p>
           <a:p>
             <a:pPr marL="285750" indent="-285750">
@@ -6209,19 +6446,12 @@
             </a:pPr>
             <a:endParaRPr lang="en-US" sz="2400" dirty="0"/>
           </a:p>
-          <a:p>
-            <a:pPr marL="285750" indent="-285750">
-              <a:buFont typeface="Arial" panose="020B0604020202020204" pitchFamily="34" charset="0"/>
-              <a:buChar char="•"/>
-            </a:pPr>
-            <a:endParaRPr lang="en-US" dirty="0"/>
-          </a:p>
         </p:txBody>
       </p:sp>
     </p:spTree>
     <p:extLst>
       <p:ext uri="{BB962C8B-B14F-4D97-AF65-F5344CB8AC3E}">
-        <p14:creationId xmlns:p14="http://schemas.microsoft.com/office/powerpoint/2010/main" val="2539724012"/>
+        <p14:creationId xmlns:p14="http://schemas.microsoft.com/office/powerpoint/2010/main" val="3212058639"/>
       </p:ext>
     </p:extLst>
   </p:cSld>
@@ -6231,7 +6461,7 @@
 </p:sld>
 </file>
 
-<file path=ppt/slides/slide5.xml><?xml version="1.0" encoding="utf-8"?>
+<file path=ppt/slides/slide4.xml><?xml version="1.0" encoding="utf-8"?>
 <p:sld xmlns:a="http://schemas.openxmlformats.org/drawingml/2006/main" xmlns:r="http://schemas.openxmlformats.org/officeDocument/2006/relationships" xmlns:p="http://schemas.openxmlformats.org/presentationml/2006/main">
   <p:cSld>
     <p:bg>
@@ -6278,7 +6508,7 @@
         </p:blipFill>
         <p:spPr>
           <a:xfrm>
-            <a:off x="1" y="612"/>
+            <a:off x="0" y="0"/>
             <a:ext cx="12188952" cy="6864271"/>
           </a:xfrm>
           <a:prstGeom prst="rect">
@@ -6635,7 +6865,7 @@
           <p:cNvPr id="4" name="TextBox 3">
             <a:extLst>
               <a:ext uri="{FF2B5EF4-FFF2-40B4-BE49-F238E27FC236}">
-                <a16:creationId xmlns:a16="http://schemas.microsoft.com/office/drawing/2014/main" id="{1879A0DE-6EF9-72BB-2E37-F925C3075E92}"/>
+                <a16:creationId xmlns:a16="http://schemas.microsoft.com/office/drawing/2014/main" id="{44E56F65-6D91-94FA-C22F-4E99F4853A59}"/>
               </a:ext>
             </a:extLst>
           </p:cNvPr>
@@ -6644,8 +6874,8 @@
         </p:nvSpPr>
         <p:spPr>
           <a:xfrm>
-            <a:off x="815926" y="572220"/>
-            <a:ext cx="10592972" cy="5078313"/>
+            <a:off x="506437" y="572220"/>
+            <a:ext cx="3575779" cy="461665"/>
           </a:xfrm>
           <a:prstGeom prst="rect">
             <a:avLst/>
@@ -6658,45 +6888,56 @@
           </a:bodyPr>
           <a:lstStyle/>
           <a:p>
+            <a:r>
+              <a:rPr lang="en-US" sz="2400" dirty="0"/>
+              <a:t>What is </a:t>
+            </a:r>
+            <a:r>
+              <a:rPr lang="en-US" sz="2400" dirty="0" err="1"/>
+              <a:t>Github</a:t>
+            </a:r>
+            <a:r>
+              <a:rPr lang="en-US" sz="2400" dirty="0"/>
+              <a:t> Copilot?</a:t>
+            </a:r>
+          </a:p>
+        </p:txBody>
+      </p:sp>
+      <p:sp>
+        <p:nvSpPr>
+          <p:cNvPr id="5" name="TextBox 4">
+            <a:extLst>
+              <a:ext uri="{FF2B5EF4-FFF2-40B4-BE49-F238E27FC236}">
+                <a16:creationId xmlns:a16="http://schemas.microsoft.com/office/drawing/2014/main" id="{DCB20D65-07BD-84FD-DA08-461974F5EDE8}"/>
+              </a:ext>
+            </a:extLst>
+          </p:cNvPr>
+          <p:cNvSpPr txBox="1"/>
+          <p:nvPr/>
+        </p:nvSpPr>
+        <p:spPr>
+          <a:xfrm>
+            <a:off x="780441" y="1171375"/>
+            <a:ext cx="9650438" cy="5909310"/>
+          </a:xfrm>
+          <a:prstGeom prst="rect">
+            <a:avLst/>
+          </a:prstGeom>
+          <a:noFill/>
+        </p:spPr>
+        <p:txBody>
+          <a:bodyPr wrap="square" rtlCol="0">
+            <a:spAutoFit/>
+          </a:bodyPr>
+          <a:lstStyle/>
+          <a:p>
             <a:pPr marL="285750" indent="-285750">
               <a:buFont typeface="Arial" panose="020B0604020202020204" pitchFamily="34" charset="0"/>
               <a:buChar char="•"/>
             </a:pPr>
             <a:r>
               <a:rPr lang="en-US" sz="2400" dirty="0"/>
-              <a:t>https://</a:t>
-            </a:r>
-            <a:r>
-              <a:rPr lang="en-US" sz="2400" dirty="0" err="1"/>
-              <a:t>docs.github.com</a:t>
-            </a:r>
-            <a:r>
-              <a:rPr lang="en-US" sz="2400" dirty="0"/>
-              <a:t>/</a:t>
-            </a:r>
-            <a:r>
-              <a:rPr lang="en-US" sz="2400" dirty="0" err="1"/>
-              <a:t>en</a:t>
-            </a:r>
-            <a:r>
-              <a:rPr lang="en-US" sz="2400" dirty="0"/>
-              <a:t>/copilot/overview-of-</a:t>
-            </a:r>
-            <a:r>
-              <a:rPr lang="en-US" sz="2400" dirty="0" err="1"/>
-              <a:t>github</a:t>
-            </a:r>
-            <a:r>
-              <a:rPr lang="en-US" sz="2400" dirty="0"/>
-              <a:t>-copilot/about-</a:t>
-            </a:r>
-            <a:r>
-              <a:rPr lang="en-US" sz="2400" dirty="0" err="1"/>
-              <a:t>github</a:t>
-            </a:r>
-            <a:r>
-              <a:rPr lang="en-US" sz="2400" dirty="0"/>
-              <a:t>-copilot-for-individuals</a:t>
+              <a:t>An AI pair programmer.  </a:t>
             </a:r>
           </a:p>
           <a:p>
@@ -6705,16 +6946,20 @@
               <a:buChar char="•"/>
             </a:pPr>
             <a:r>
+              <a:rPr lang="en-US" sz="2400" dirty="0" err="1"/>
+              <a:t>Github</a:t>
+            </a:r>
+            <a:r>
               <a:rPr lang="en-US" sz="2400" dirty="0"/>
-              <a:t>Works with VS Code, Visual Studio, </a:t>
+              <a:t> Copilot X was announced around September of 2023.  X is a placeholder.  Essentially, it is a family of projects/products that utilize the </a:t>
             </a:r>
             <a:r>
               <a:rPr lang="en-US" sz="2400" dirty="0" err="1"/>
-              <a:t>NeoVim</a:t>
+              <a:t>Github</a:t>
             </a:r>
             <a:r>
               <a:rPr lang="en-US" sz="2400" dirty="0"/>
-              <a:t>/Vim, and JetBrains IDEs</a:t>
+              <a:t> Copilot technology to give a more complete programming experience. </a:t>
             </a:r>
           </a:p>
           <a:p>
@@ -6724,11 +6969,586 @@
             </a:pPr>
             <a:r>
               <a:rPr lang="en-US" sz="2400" dirty="0"/>
-              <a:t>List of JetBrains compatible IDEs </a:t>
+              <a:t>Copilot Chat – Chat-GPT like.  </a:t>
+            </a:r>
+          </a:p>
+          <a:p>
+            <a:pPr marL="742950" lvl="1" indent="-285750">
+              <a:buFont typeface="Arial" panose="020B0604020202020204" pitchFamily="34" charset="0"/>
+              <a:buChar char="•"/>
+            </a:pPr>
+            <a:r>
+              <a:rPr lang="en-US" sz="2400" dirty="0"/>
+              <a:t>Copilot CLI, Copilot for PR, …etc.</a:t>
+            </a:r>
+          </a:p>
+          <a:p>
+            <a:pPr marL="742950" lvl="1" indent="-285750">
+              <a:buFont typeface="Arial" panose="020B0604020202020204" pitchFamily="34" charset="0"/>
+              <a:buChar char="•"/>
+            </a:pPr>
+            <a:r>
+              <a:rPr lang="en-US" sz="2400" dirty="0"/>
+              <a:t>View them at </a:t>
+            </a:r>
+            <a:r>
+              <a:rPr lang="en-US" sz="2400" dirty="0" err="1"/>
+              <a:t>githubnext.com</a:t>
+            </a:r>
+            <a:endParaRPr lang="en-US" sz="2400" dirty="0"/>
+          </a:p>
+          <a:p>
+            <a:pPr marL="285750" indent="-285750">
+              <a:buFont typeface="Arial" panose="020B0604020202020204" pitchFamily="34" charset="0"/>
+              <a:buChar char="•"/>
+            </a:pPr>
+            <a:r>
+              <a:rPr lang="en-US" sz="2400" dirty="0"/>
+              <a:t>Need a </a:t>
+            </a:r>
+            <a:r>
+              <a:rPr lang="en-US" sz="2400" dirty="0" err="1"/>
+              <a:t>Github</a:t>
+            </a:r>
+            <a:r>
+              <a:rPr lang="en-US" sz="2400" dirty="0"/>
+              <a:t> account</a:t>
+            </a:r>
+          </a:p>
+          <a:p>
+            <a:pPr marL="285750" indent="-285750">
+              <a:buFont typeface="Arial" panose="020B0604020202020204" pitchFamily="34" charset="0"/>
+              <a:buChar char="•"/>
+            </a:pPr>
+            <a:r>
+              <a:rPr lang="en-US" sz="2400" dirty="0"/>
+              <a:t>Pricing: Free tier; one time 30-day trial, $10 per month for individuals; $19 for business license </a:t>
             </a:r>
             <a:r>
               <a:rPr lang="en-US" sz="2400" dirty="0">
                 <a:hlinkClick r:id="rId4"/>
+              </a:rPr>
+              <a:t>https://github.com/features/copilot/plans?cft=copilot_lo.features_copilot</a:t>
+            </a:r>
+            <a:endParaRPr lang="en-US" sz="2400" dirty="0"/>
+          </a:p>
+          <a:p>
+            <a:pPr marL="285750" indent="-285750">
+              <a:buFont typeface="Arial" panose="020B0604020202020204" pitchFamily="34" charset="0"/>
+              <a:buChar char="•"/>
+            </a:pPr>
+            <a:endParaRPr lang="en-US" sz="2400" dirty="0"/>
+          </a:p>
+          <a:p>
+            <a:pPr lvl="1"/>
+            <a:endParaRPr lang="en-US" sz="2400" dirty="0"/>
+          </a:p>
+          <a:p>
+            <a:pPr marL="285750" indent="-285750">
+              <a:buFont typeface="Arial" panose="020B0604020202020204" pitchFamily="34" charset="0"/>
+              <a:buChar char="•"/>
+            </a:pPr>
+            <a:endParaRPr lang="en-US" sz="2400" dirty="0"/>
+          </a:p>
+          <a:p>
+            <a:pPr marL="285750" indent="-285750">
+              <a:buFont typeface="Arial" panose="020B0604020202020204" pitchFamily="34" charset="0"/>
+              <a:buChar char="•"/>
+            </a:pPr>
+            <a:endParaRPr lang="en-US" dirty="0"/>
+          </a:p>
+        </p:txBody>
+      </p:sp>
+    </p:spTree>
+    <p:extLst>
+      <p:ext uri="{BB962C8B-B14F-4D97-AF65-F5344CB8AC3E}">
+        <p14:creationId xmlns:p14="http://schemas.microsoft.com/office/powerpoint/2010/main" val="2539724012"/>
+      </p:ext>
+    </p:extLst>
+  </p:cSld>
+  <p:clrMapOvr>
+    <a:masterClrMapping/>
+  </p:clrMapOvr>
+</p:sld>
+</file>
+
+<file path=ppt/slides/slide5.xml><?xml version="1.0" encoding="utf-8"?>
+<p:sld xmlns:a="http://schemas.openxmlformats.org/drawingml/2006/main" xmlns:r="http://schemas.openxmlformats.org/officeDocument/2006/relationships" xmlns:p="http://schemas.openxmlformats.org/presentationml/2006/main">
+  <p:cSld>
+    <p:bg>
+      <p:bgPr>
+        <a:solidFill>
+          <a:schemeClr val="bg1"/>
+        </a:solidFill>
+        <a:effectLst/>
+      </p:bgPr>
+    </p:bg>
+    <p:spTree>
+      <p:nvGrpSpPr>
+        <p:cNvPr id="1" name=""/>
+        <p:cNvGrpSpPr/>
+        <p:nvPr/>
+      </p:nvGrpSpPr>
+      <p:grpSpPr>
+        <a:xfrm>
+          <a:off x="0" y="0"/>
+          <a:ext cx="0" cy="0"/>
+          <a:chOff x="0" y="0"/>
+          <a:chExt cx="0" cy="0"/>
+        </a:xfrm>
+      </p:grpSpPr>
+      <p:pic>
+        <p:nvPicPr>
+          <p:cNvPr id="12" name="Picture 11">
+            <a:extLst>
+              <a:ext uri="{FF2B5EF4-FFF2-40B4-BE49-F238E27FC236}">
+                <a16:creationId xmlns:a16="http://schemas.microsoft.com/office/drawing/2014/main" id="{E5715E08-146D-0759-2720-E84D70786BC1}"/>
+              </a:ext>
+            </a:extLst>
+          </p:cNvPr>
+          <p:cNvPicPr>
+            <a:picLocks noChangeAspect="1"/>
+          </p:cNvPicPr>
+          <p:nvPr/>
+        </p:nvPicPr>
+        <p:blipFill>
+          <a:blip r:embed="rId2"/>
+          <a:stretch>
+            <a:fillRect/>
+          </a:stretch>
+        </p:blipFill>
+        <p:spPr>
+          <a:xfrm>
+            <a:off x="1" y="612"/>
+            <a:ext cx="12188952" cy="6864271"/>
+          </a:xfrm>
+          <a:prstGeom prst="rect">
+            <a:avLst/>
+          </a:prstGeom>
+        </p:spPr>
+      </p:pic>
+      <p:sp>
+        <p:nvSpPr>
+          <p:cNvPr id="10" name="Rectangle 9">
+            <a:extLst>
+              <a:ext uri="{FF2B5EF4-FFF2-40B4-BE49-F238E27FC236}">
+                <a16:creationId xmlns:a16="http://schemas.microsoft.com/office/drawing/2014/main" id="{42A4FC2C-047E-45A5-965D-8E1E3BF09BC6}"/>
+              </a:ext>
+              <a:ext uri="{C183D7F6-B498-43B3-948B-1728B52AA6E4}">
+                <adec:decorative xmlns:adec="http://schemas.microsoft.com/office/drawing/2017/decorative" val="1"/>
+              </a:ext>
+            </a:extLst>
+          </p:cNvPr>
+          <p:cNvSpPr>
+            <a:spLocks noGrp="1" noRot="1" noChangeAspect="1" noMove="1" noResize="1" noEditPoints="1" noAdjustHandles="1" noChangeArrowheads="1" noChangeShapeType="1" noTextEdit="1"/>
+          </p:cNvSpPr>
+          <p:nvPr>
+            <p:extLst>
+              <p:ext uri="{386F3935-93C4-4BCD-93E2-E3B085C9AB24}">
+                <p16:designElem xmlns:p16="http://schemas.microsoft.com/office/powerpoint/2015/main" val="1"/>
+              </p:ext>
+            </p:extLst>
+          </p:nvPr>
+        </p:nvSpPr>
+        <p:spPr bwMode="white">
+          <a:xfrm>
+            <a:off x="1524" y="0"/>
+            <a:ext cx="12188952" cy="6858000"/>
+          </a:xfrm>
+          <a:prstGeom prst="rect">
+            <a:avLst/>
+          </a:prstGeom>
+          <a:noFill/>
+          <a:ln>
+            <a:noFill/>
+          </a:ln>
+        </p:spPr>
+        <p:style>
+          <a:lnRef idx="2">
+            <a:schemeClr val="accent1">
+              <a:shade val="50000"/>
+            </a:schemeClr>
+          </a:lnRef>
+          <a:fillRef idx="1">
+            <a:schemeClr val="accent1"/>
+          </a:fillRef>
+          <a:effectRef idx="0">
+            <a:schemeClr val="accent1"/>
+          </a:effectRef>
+          <a:fontRef idx="minor">
+            <a:schemeClr val="lt1"/>
+          </a:fontRef>
+        </p:style>
+        <p:txBody>
+          <a:bodyPr rtlCol="0" anchor="ctr"/>
+          <a:lstStyle>
+            <a:defPPr>
+              <a:defRPr lang="en-US"/>
+            </a:defPPr>
+            <a:lvl1pPr marL="0" algn="l" defTabSz="914400" rtl="0" eaLnBrk="1" latinLnBrk="0" hangingPunct="1">
+              <a:defRPr sz="1800" kern="1200">
+                <a:solidFill>
+                  <a:schemeClr val="lt1"/>
+                </a:solidFill>
+                <a:latin typeface="+mn-lt"/>
+                <a:ea typeface="+mn-ea"/>
+                <a:cs typeface="+mn-cs"/>
+              </a:defRPr>
+            </a:lvl1pPr>
+            <a:lvl2pPr marL="457200" algn="l" defTabSz="914400" rtl="0" eaLnBrk="1" latinLnBrk="0" hangingPunct="1">
+              <a:defRPr sz="1800" kern="1200">
+                <a:solidFill>
+                  <a:schemeClr val="lt1"/>
+                </a:solidFill>
+                <a:latin typeface="+mn-lt"/>
+                <a:ea typeface="+mn-ea"/>
+                <a:cs typeface="+mn-cs"/>
+              </a:defRPr>
+            </a:lvl2pPr>
+            <a:lvl3pPr marL="914400" algn="l" defTabSz="914400" rtl="0" eaLnBrk="1" latinLnBrk="0" hangingPunct="1">
+              <a:defRPr sz="1800" kern="1200">
+                <a:solidFill>
+                  <a:schemeClr val="lt1"/>
+                </a:solidFill>
+                <a:latin typeface="+mn-lt"/>
+                <a:ea typeface="+mn-ea"/>
+                <a:cs typeface="+mn-cs"/>
+              </a:defRPr>
+            </a:lvl3pPr>
+            <a:lvl4pPr marL="1371600" algn="l" defTabSz="914400" rtl="0" eaLnBrk="1" latinLnBrk="0" hangingPunct="1">
+              <a:defRPr sz="1800" kern="1200">
+                <a:solidFill>
+                  <a:schemeClr val="lt1"/>
+                </a:solidFill>
+                <a:latin typeface="+mn-lt"/>
+                <a:ea typeface="+mn-ea"/>
+                <a:cs typeface="+mn-cs"/>
+              </a:defRPr>
+            </a:lvl4pPr>
+            <a:lvl5pPr marL="1828800" algn="l" defTabSz="914400" rtl="0" eaLnBrk="1" latinLnBrk="0" hangingPunct="1">
+              <a:defRPr sz="1800" kern="1200">
+                <a:solidFill>
+                  <a:schemeClr val="lt1"/>
+                </a:solidFill>
+                <a:latin typeface="+mn-lt"/>
+                <a:ea typeface="+mn-ea"/>
+                <a:cs typeface="+mn-cs"/>
+              </a:defRPr>
+            </a:lvl5pPr>
+            <a:lvl6pPr marL="2286000" algn="l" defTabSz="914400" rtl="0" eaLnBrk="1" latinLnBrk="0" hangingPunct="1">
+              <a:defRPr sz="1800" kern="1200">
+                <a:solidFill>
+                  <a:schemeClr val="lt1"/>
+                </a:solidFill>
+                <a:latin typeface="+mn-lt"/>
+                <a:ea typeface="+mn-ea"/>
+                <a:cs typeface="+mn-cs"/>
+              </a:defRPr>
+            </a:lvl6pPr>
+            <a:lvl7pPr marL="2743200" algn="l" defTabSz="914400" rtl="0" eaLnBrk="1" latinLnBrk="0" hangingPunct="1">
+              <a:defRPr sz="1800" kern="1200">
+                <a:solidFill>
+                  <a:schemeClr val="lt1"/>
+                </a:solidFill>
+                <a:latin typeface="+mn-lt"/>
+                <a:ea typeface="+mn-ea"/>
+                <a:cs typeface="+mn-cs"/>
+              </a:defRPr>
+            </a:lvl7pPr>
+            <a:lvl8pPr marL="3200400" algn="l" defTabSz="914400" rtl="0" eaLnBrk="1" latinLnBrk="0" hangingPunct="1">
+              <a:defRPr sz="1800" kern="1200">
+                <a:solidFill>
+                  <a:schemeClr val="lt1"/>
+                </a:solidFill>
+                <a:latin typeface="+mn-lt"/>
+                <a:ea typeface="+mn-ea"/>
+                <a:cs typeface="+mn-cs"/>
+              </a:defRPr>
+            </a:lvl8pPr>
+            <a:lvl9pPr marL="3657600" algn="l" defTabSz="914400" rtl="0" eaLnBrk="1" latinLnBrk="0" hangingPunct="1">
+              <a:defRPr sz="1800" kern="1200">
+                <a:solidFill>
+                  <a:schemeClr val="lt1"/>
+                </a:solidFill>
+                <a:latin typeface="+mn-lt"/>
+                <a:ea typeface="+mn-ea"/>
+                <a:cs typeface="+mn-cs"/>
+              </a:defRPr>
+            </a:lvl9pPr>
+          </a:lstStyle>
+          <a:p>
+            <a:pPr algn="ctr"/>
+            <a:endParaRPr lang="en-US"/>
+          </a:p>
+        </p:txBody>
+      </p:sp>
+      <p:sp>
+        <p:nvSpPr>
+          <p:cNvPr id="11" name="Footer Placeholder 10">
+            <a:extLst>
+              <a:ext uri="{FF2B5EF4-FFF2-40B4-BE49-F238E27FC236}">
+                <a16:creationId xmlns:a16="http://schemas.microsoft.com/office/drawing/2014/main" id="{BB1C0603-8047-1EA8-656C-93CC9FF56BB4}"/>
+              </a:ext>
+            </a:extLst>
+          </p:cNvPr>
+          <p:cNvSpPr>
+            <a:spLocks noGrp="1"/>
+          </p:cNvSpPr>
+          <p:nvPr>
+            <p:ph type="ftr" sz="quarter" idx="11"/>
+          </p:nvPr>
+        </p:nvSpPr>
+        <p:spPr>
+          <a:xfrm>
+            <a:off x="8696325" y="6462298"/>
+            <a:ext cx="4114800" cy="365125"/>
+          </a:xfrm>
+        </p:spPr>
+        <p:txBody>
+          <a:bodyPr/>
+          <a:lstStyle/>
+          <a:p>
+            <a:r>
+              <a:rPr lang="en-US" sz="1400" dirty="0">
+                <a:latin typeface="DunbarTall" panose="00000000000000020000" pitchFamily="50" charset="0"/>
+              </a:rPr>
+              <a:t>	 Omaha, NE</a:t>
+            </a:r>
+          </a:p>
+        </p:txBody>
+      </p:sp>
+      <p:sp>
+        <p:nvSpPr>
+          <p:cNvPr id="2" name="Freeform: Shape 1">
+            <a:extLst>
+              <a:ext uri="{FF2B5EF4-FFF2-40B4-BE49-F238E27FC236}">
+                <a16:creationId xmlns:a16="http://schemas.microsoft.com/office/drawing/2014/main" id="{6DAD8027-1835-30F1-2138-FEEFB4294F47}"/>
+              </a:ext>
+            </a:extLst>
+          </p:cNvPr>
+          <p:cNvSpPr/>
+          <p:nvPr/>
+        </p:nvSpPr>
+        <p:spPr>
+          <a:xfrm>
+            <a:off x="-11151" y="5700713"/>
+            <a:ext cx="12243125" cy="585067"/>
+          </a:xfrm>
+          <a:custGeom>
+            <a:avLst/>
+            <a:gdLst>
+              <a:gd name="connsiteX0" fmla="*/ 0 w 12243125"/>
+              <a:gd name="connsiteY0" fmla="*/ 186706 h 2145814"/>
+              <a:gd name="connsiteX1" fmla="*/ 3880624 w 12243125"/>
+              <a:gd name="connsiteY1" fmla="*/ 186706 h 2145814"/>
+              <a:gd name="connsiteX2" fmla="*/ 9088244 w 12243125"/>
+              <a:gd name="connsiteY2" fmla="*/ 2127018 h 2145814"/>
+              <a:gd name="connsiteX3" fmla="*/ 11976410 w 12243125"/>
+              <a:gd name="connsiteY3" fmla="*/ 1223770 h 2145814"/>
+              <a:gd name="connsiteX4" fmla="*/ 12132527 w 12243125"/>
+              <a:gd name="connsiteY4" fmla="*/ 1179165 h 2145814"/>
+              <a:gd name="connsiteX5" fmla="*/ 12132527 w 12243125"/>
+              <a:gd name="connsiteY5" fmla="*/ 1190316 h 2145814"/>
+            </a:gdLst>
+            <a:ahLst/>
+            <a:cxnLst>
+              <a:cxn ang="0">
+                <a:pos x="connsiteX0" y="connsiteY0"/>
+              </a:cxn>
+              <a:cxn ang="0">
+                <a:pos x="connsiteX1" y="connsiteY1"/>
+              </a:cxn>
+              <a:cxn ang="0">
+                <a:pos x="connsiteX2" y="connsiteY2"/>
+              </a:cxn>
+              <a:cxn ang="0">
+                <a:pos x="connsiteX3" y="connsiteY3"/>
+              </a:cxn>
+              <a:cxn ang="0">
+                <a:pos x="connsiteX4" y="connsiteY4"/>
+              </a:cxn>
+              <a:cxn ang="0">
+                <a:pos x="connsiteX5" y="connsiteY5"/>
+              </a:cxn>
+            </a:cxnLst>
+            <a:rect l="l" t="t" r="r" b="b"/>
+            <a:pathLst>
+              <a:path w="12243125" h="2145814">
+                <a:moveTo>
+                  <a:pt x="0" y="186706"/>
+                </a:moveTo>
+                <a:cubicBezTo>
+                  <a:pt x="1182958" y="25013"/>
+                  <a:pt x="2365917" y="-136679"/>
+                  <a:pt x="3880624" y="186706"/>
+                </a:cubicBezTo>
+                <a:cubicBezTo>
+                  <a:pt x="5395331" y="510091"/>
+                  <a:pt x="7738946" y="1954174"/>
+                  <a:pt x="9088244" y="2127018"/>
+                </a:cubicBezTo>
+                <a:cubicBezTo>
+                  <a:pt x="10437542" y="2299862"/>
+                  <a:pt x="11976410" y="1223770"/>
+                  <a:pt x="11976410" y="1223770"/>
+                </a:cubicBezTo>
+                <a:cubicBezTo>
+                  <a:pt x="12483791" y="1065795"/>
+                  <a:pt x="12106508" y="1184741"/>
+                  <a:pt x="12132527" y="1179165"/>
+                </a:cubicBezTo>
+                <a:cubicBezTo>
+                  <a:pt x="12158547" y="1173589"/>
+                  <a:pt x="12145537" y="1181952"/>
+                  <a:pt x="12132527" y="1190316"/>
+                </a:cubicBezTo>
+              </a:path>
+            </a:pathLst>
+          </a:custGeom>
+          <a:noFill/>
+          <a:effectLst>
+            <a:reflection blurRad="6350" stA="53000" endPos="35000" dir="5400000" sy="-100000" algn="bl" rotWithShape="0"/>
+          </a:effectLst>
+        </p:spPr>
+        <p:style>
+          <a:lnRef idx="2">
+            <a:schemeClr val="accent1">
+              <a:shade val="15000"/>
+            </a:schemeClr>
+          </a:lnRef>
+          <a:fillRef idx="1">
+            <a:schemeClr val="accent1"/>
+          </a:fillRef>
+          <a:effectRef idx="0">
+            <a:schemeClr val="accent1"/>
+          </a:effectRef>
+          <a:fontRef idx="minor">
+            <a:schemeClr val="lt1"/>
+          </a:fontRef>
+        </p:style>
+        <p:txBody>
+          <a:bodyPr rtlCol="0" anchor="ctr"/>
+          <a:lstStyle/>
+          <a:p>
+            <a:pPr algn="ctr"/>
+            <a:endParaRPr lang="en-US" dirty="0"/>
+          </a:p>
+        </p:txBody>
+      </p:sp>
+      <p:pic>
+        <p:nvPicPr>
+          <p:cNvPr id="3" name="Picture 2" descr="A logo with a black background&#10;&#10;Description automatically generated">
+            <a:extLst>
+              <a:ext uri="{FF2B5EF4-FFF2-40B4-BE49-F238E27FC236}">
+                <a16:creationId xmlns:a16="http://schemas.microsoft.com/office/drawing/2014/main" id="{82989756-ED00-35D0-B232-FF0105CF924D}"/>
+              </a:ext>
+            </a:extLst>
+          </p:cNvPr>
+          <p:cNvPicPr>
+            <a:picLocks noChangeAspect="1"/>
+          </p:cNvPicPr>
+          <p:nvPr/>
+        </p:nvPicPr>
+        <p:blipFill>
+          <a:blip r:embed="rId3">
+            <a:extLst>
+              <a:ext uri="{28A0092B-C50C-407E-A947-70E740481C1C}">
+                <a14:useLocalDpi xmlns:a14="http://schemas.microsoft.com/office/drawing/2010/main" val="0"/>
+              </a:ext>
+            </a:extLst>
+          </a:blip>
+          <a:stretch>
+            <a:fillRect/>
+          </a:stretch>
+        </p:blipFill>
+        <p:spPr>
+          <a:xfrm>
+            <a:off x="52768" y="5541794"/>
+            <a:ext cx="2462226" cy="1538891"/>
+          </a:xfrm>
+          <a:prstGeom prst="rect">
+            <a:avLst/>
+          </a:prstGeom>
+        </p:spPr>
+      </p:pic>
+      <p:sp>
+        <p:nvSpPr>
+          <p:cNvPr id="4" name="TextBox 3">
+            <a:extLst>
+              <a:ext uri="{FF2B5EF4-FFF2-40B4-BE49-F238E27FC236}">
+                <a16:creationId xmlns:a16="http://schemas.microsoft.com/office/drawing/2014/main" id="{1879A0DE-6EF9-72BB-2E37-F925C3075E92}"/>
+              </a:ext>
+            </a:extLst>
+          </p:cNvPr>
+          <p:cNvSpPr txBox="1"/>
+          <p:nvPr/>
+        </p:nvSpPr>
+        <p:spPr>
+          <a:xfrm>
+            <a:off x="815926" y="572220"/>
+            <a:ext cx="10592972" cy="5447645"/>
+          </a:xfrm>
+          <a:prstGeom prst="rect">
+            <a:avLst/>
+          </a:prstGeom>
+          <a:noFill/>
+        </p:spPr>
+        <p:txBody>
+          <a:bodyPr wrap="square" rtlCol="0">
+            <a:spAutoFit/>
+          </a:bodyPr>
+          <a:lstStyle/>
+          <a:p>
+            <a:pPr marL="285750" indent="-285750">
+              <a:buFont typeface="Arial" panose="020B0604020202020204" pitchFamily="34" charset="0"/>
+              <a:buChar char="•"/>
+            </a:pPr>
+            <a:r>
+              <a:rPr lang="en-US" sz="2400" dirty="0">
+                <a:hlinkClick r:id="rId4"/>
+              </a:rPr>
+              <a:t>https://docs.github.com/en/copilot/overview-of-github-copilot/about-github-copilot-for-individuals</a:t>
+            </a:r>
+            <a:endParaRPr lang="en-US" sz="2400" dirty="0"/>
+          </a:p>
+          <a:p>
+            <a:pPr marL="285750" indent="-285750">
+              <a:buFont typeface="Arial" panose="020B0604020202020204" pitchFamily="34" charset="0"/>
+              <a:buChar char="•"/>
+            </a:pPr>
+            <a:r>
+              <a:rPr lang="en-US" sz="2400" dirty="0"/>
+              <a:t>Works with VS Code, Visual Studio, </a:t>
+            </a:r>
+            <a:r>
+              <a:rPr lang="en-US" sz="2400" dirty="0" err="1"/>
+              <a:t>NeoVim</a:t>
+            </a:r>
+            <a:r>
+              <a:rPr lang="en-US" sz="2400" dirty="0"/>
+              <a:t>/Vim, Eclipse, Azure Data Studio, </a:t>
+            </a:r>
+            <a:r>
+              <a:rPr lang="en-US" sz="2400" dirty="0" err="1"/>
+              <a:t>XCode</a:t>
+            </a:r>
+            <a:r>
+              <a:rPr lang="en-US" sz="2400" dirty="0"/>
+              <a:t>, and JetBrains IDEs</a:t>
+            </a:r>
+          </a:p>
+          <a:p>
+            <a:pPr marL="742950" lvl="1" indent="-285750">
+              <a:buFont typeface="Arial" panose="020B0604020202020204" pitchFamily="34" charset="0"/>
+              <a:buChar char="•"/>
+            </a:pPr>
+            <a:r>
+              <a:rPr lang="en-US" sz="2400" dirty="0"/>
+              <a:t>List of JetBrains compatible IDEs </a:t>
+            </a:r>
+            <a:r>
+              <a:rPr lang="en-US" sz="2400" dirty="0">
+                <a:hlinkClick r:id="rId5"/>
               </a:rPr>
               <a:t>https://docs.github.com/en/copilot/getting-started-with-github-copilot?tool=jetbrains</a:t>
             </a:r>

</xml_diff>